<commit_message>
Add error handling to find_Accel_Synchro_target( ) so query only handles 1 result
</commit_message>
<xml_diff>
--- a/images/Spell database diagram.pptx
+++ b/images/Spell database diagram.pptx
@@ -259,7 +259,7 @@
           <a:p>
             <a:fld id="{2EA71DFD-377C-4EB5-BA3E-17FDF086A0CC}" type="datetimeFigureOut">
               <a:rPr lang="en-US" smtClean="0"/>
-              <a:t>8/31/2024</a:t>
+              <a:t>9/5/2024</a:t>
             </a:fld>
             <a:endParaRPr lang="en-US"/>
           </a:p>
@@ -457,7 +457,7 @@
           <a:p>
             <a:fld id="{2EA71DFD-377C-4EB5-BA3E-17FDF086A0CC}" type="datetimeFigureOut">
               <a:rPr lang="en-US" smtClean="0"/>
-              <a:t>8/31/2024</a:t>
+              <a:t>9/5/2024</a:t>
             </a:fld>
             <a:endParaRPr lang="en-US"/>
           </a:p>
@@ -665,7 +665,7 @@
           <a:p>
             <a:fld id="{2EA71DFD-377C-4EB5-BA3E-17FDF086A0CC}" type="datetimeFigureOut">
               <a:rPr lang="en-US" smtClean="0"/>
-              <a:t>8/31/2024</a:t>
+              <a:t>9/5/2024</a:t>
             </a:fld>
             <a:endParaRPr lang="en-US"/>
           </a:p>
@@ -863,7 +863,7 @@
           <a:p>
             <a:fld id="{2EA71DFD-377C-4EB5-BA3E-17FDF086A0CC}" type="datetimeFigureOut">
               <a:rPr lang="en-US" smtClean="0"/>
-              <a:t>8/31/2024</a:t>
+              <a:t>9/5/2024</a:t>
             </a:fld>
             <a:endParaRPr lang="en-US"/>
           </a:p>
@@ -1138,7 +1138,7 @@
           <a:p>
             <a:fld id="{2EA71DFD-377C-4EB5-BA3E-17FDF086A0CC}" type="datetimeFigureOut">
               <a:rPr lang="en-US" smtClean="0"/>
-              <a:t>8/31/2024</a:t>
+              <a:t>9/5/2024</a:t>
             </a:fld>
             <a:endParaRPr lang="en-US"/>
           </a:p>
@@ -1403,7 +1403,7 @@
           <a:p>
             <a:fld id="{2EA71DFD-377C-4EB5-BA3E-17FDF086A0CC}" type="datetimeFigureOut">
               <a:rPr lang="en-US" smtClean="0"/>
-              <a:t>8/31/2024</a:t>
+              <a:t>9/5/2024</a:t>
             </a:fld>
             <a:endParaRPr lang="en-US"/>
           </a:p>
@@ -1815,7 +1815,7 @@
           <a:p>
             <a:fld id="{2EA71DFD-377C-4EB5-BA3E-17FDF086A0CC}" type="datetimeFigureOut">
               <a:rPr lang="en-US" smtClean="0"/>
-              <a:t>8/31/2024</a:t>
+              <a:t>9/5/2024</a:t>
             </a:fld>
             <a:endParaRPr lang="en-US"/>
           </a:p>
@@ -1956,7 +1956,7 @@
           <a:p>
             <a:fld id="{2EA71DFD-377C-4EB5-BA3E-17FDF086A0CC}" type="datetimeFigureOut">
               <a:rPr lang="en-US" smtClean="0"/>
-              <a:t>8/31/2024</a:t>
+              <a:t>9/5/2024</a:t>
             </a:fld>
             <a:endParaRPr lang="en-US"/>
           </a:p>
@@ -2069,7 +2069,7 @@
           <a:p>
             <a:fld id="{2EA71DFD-377C-4EB5-BA3E-17FDF086A0CC}" type="datetimeFigureOut">
               <a:rPr lang="en-US" smtClean="0"/>
-              <a:t>8/31/2024</a:t>
+              <a:t>9/5/2024</a:t>
             </a:fld>
             <a:endParaRPr lang="en-US"/>
           </a:p>
@@ -2380,7 +2380,7 @@
           <a:p>
             <a:fld id="{2EA71DFD-377C-4EB5-BA3E-17FDF086A0CC}" type="datetimeFigureOut">
               <a:rPr lang="en-US" smtClean="0"/>
-              <a:t>8/31/2024</a:t>
+              <a:t>9/5/2024</a:t>
             </a:fld>
             <a:endParaRPr lang="en-US"/>
           </a:p>
@@ -2668,7 +2668,7 @@
           <a:p>
             <a:fld id="{2EA71DFD-377C-4EB5-BA3E-17FDF086A0CC}" type="datetimeFigureOut">
               <a:rPr lang="en-US" smtClean="0"/>
-              <a:t>8/31/2024</a:t>
+              <a:t>9/5/2024</a:t>
             </a:fld>
             <a:endParaRPr lang="en-US"/>
           </a:p>
@@ -2909,7 +2909,7 @@
           <a:p>
             <a:fld id="{2EA71DFD-377C-4EB5-BA3E-17FDF086A0CC}" type="datetimeFigureOut">
               <a:rPr lang="en-US" smtClean="0"/>
-              <a:t>8/31/2024</a:t>
+              <a:t>9/5/2024</a:t>
             </a:fld>
             <a:endParaRPr lang="en-US"/>
           </a:p>
@@ -3341,7 +3341,7 @@
           <p:nvPr>
             <p:extLst>
               <p:ext uri="{D42A27DB-BD31-4B8C-83A1-F6EECF244321}">
-                <p14:modId xmlns:p14="http://schemas.microsoft.com/office/powerpoint/2010/main" val="2075557853"/>
+                <p14:modId xmlns:p14="http://schemas.microsoft.com/office/powerpoint/2010/main" val="3923719173"/>
               </p:ext>
             </p:extLst>
           </p:nvPr>
@@ -3461,7 +3461,7 @@
                       </a:r>
                       <a:r>
                         <a:rPr lang="en-US" sz="1200" dirty="0"/>
-                        <a:t> TEXT NOT NULL</a:t>
+                        <a:t> TEXT UNIQUE NOT NULL</a:t>
                       </a:r>
                     </a:p>
                   </a:txBody>
@@ -3470,6 +3470,53 @@
                 <a:extLst>
                   <a:ext uri="{0D108BD9-81ED-4DB2-BD59-A6C34878D82A}">
                     <a16:rowId xmlns:a16="http://schemas.microsoft.com/office/drawing/2014/main" val="2613537595"/>
+                  </a:ext>
+                </a:extLst>
+              </a:tr>
+              <a:tr h="194776">
+                <a:tc>
+                  <a:txBody>
+                    <a:bodyPr/>
+                    <a:lstStyle/>
+                    <a:p>
+                      <a:endParaRPr lang="en-US" sz="1200" dirty="0"/>
+                    </a:p>
+                  </a:txBody>
+                  <a:tcPr/>
+                </a:tc>
+                <a:tc>
+                  <a:txBody>
+                    <a:bodyPr/>
+                    <a:lstStyle/>
+                    <a:p>
+                      <a:pPr marL="0" marR="0" lvl="0" indent="0" algn="l" defTabSz="914400" rtl="0" eaLnBrk="1" fontAlgn="auto" latinLnBrk="0" hangingPunct="1">
+                        <a:lnSpc>
+                          <a:spcPct val="100000"/>
+                        </a:lnSpc>
+                        <a:spcBef>
+                          <a:spcPts val="0"/>
+                        </a:spcBef>
+                        <a:spcAft>
+                          <a:spcPts val="0"/>
+                        </a:spcAft>
+                        <a:buClrTx/>
+                        <a:buSzTx/>
+                        <a:buFontTx/>
+                        <a:buNone/>
+                        <a:tabLst/>
+                        <a:defRPr/>
+                      </a:pPr>
+                      <a:r>
+                        <a:rPr lang="en-US" sz="1200" dirty="0"/>
+                        <a:t>level INT NOT NULL</a:t>
+                      </a:r>
+                    </a:p>
+                  </a:txBody>
+                  <a:tcPr/>
+                </a:tc>
+                <a:extLst>
+                  <a:ext uri="{0D108BD9-81ED-4DB2-BD59-A6C34878D82A}">
+                    <a16:rowId xmlns:a16="http://schemas.microsoft.com/office/drawing/2014/main" val="1136051870"/>
                   </a:ext>
                 </a:extLst>
               </a:tr>
@@ -3503,7 +3550,148 @@
                 </a:tc>
                 <a:extLst>
                   <a:ext uri="{0D108BD9-81ED-4DB2-BD59-A6C34878D82A}">
-                    <a16:rowId xmlns:a16="http://schemas.microsoft.com/office/drawing/2014/main" val="1136051870"/>
+                    <a16:rowId xmlns:a16="http://schemas.microsoft.com/office/drawing/2014/main" val="3143660726"/>
+                  </a:ext>
+                </a:extLst>
+              </a:tr>
+              <a:tr h="194776">
+                <a:tc>
+                  <a:txBody>
+                    <a:bodyPr/>
+                    <a:lstStyle/>
+                    <a:p>
+                      <a:endParaRPr lang="en-US" sz="1200" dirty="0"/>
+                    </a:p>
+                  </a:txBody>
+                  <a:tcPr/>
+                </a:tc>
+                <a:tc>
+                  <a:txBody>
+                    <a:bodyPr/>
+                    <a:lstStyle/>
+                    <a:p>
+                      <a:pPr marL="0" marR="0" lvl="0" indent="0" algn="l" defTabSz="914400" rtl="0" eaLnBrk="1" fontAlgn="auto" latinLnBrk="0" hangingPunct="1">
+                        <a:lnSpc>
+                          <a:spcPct val="100000"/>
+                        </a:lnSpc>
+                        <a:spcBef>
+                          <a:spcPts val="0"/>
+                        </a:spcBef>
+                        <a:spcAft>
+                          <a:spcPts val="0"/>
+                        </a:spcAft>
+                        <a:buClrTx/>
+                        <a:buSzTx/>
+                        <a:buFontTx/>
+                        <a:buNone/>
+                        <a:tabLst/>
+                        <a:defRPr/>
+                      </a:pPr>
+                      <a:r>
+                        <a:rPr lang="en-US" sz="1200" dirty="0"/>
+                        <a:t>duration TEXT NOT NULL</a:t>
+                      </a:r>
+                    </a:p>
+                  </a:txBody>
+                  <a:tcPr/>
+                </a:tc>
+                <a:extLst>
+                  <a:ext uri="{0D108BD9-81ED-4DB2-BD59-A6C34878D82A}">
+                    <a16:rowId xmlns:a16="http://schemas.microsoft.com/office/drawing/2014/main" val="106472998"/>
+                  </a:ext>
+                </a:extLst>
+              </a:tr>
+              <a:tr h="194776">
+                <a:tc>
+                  <a:txBody>
+                    <a:bodyPr/>
+                    <a:lstStyle/>
+                    <a:p>
+                      <a:endParaRPr lang="en-US" sz="1200" dirty="0"/>
+                    </a:p>
+                  </a:txBody>
+                  <a:tcPr/>
+                </a:tc>
+                <a:tc>
+                  <a:txBody>
+                    <a:bodyPr/>
+                    <a:lstStyle/>
+                    <a:p>
+                      <a:pPr marL="0" marR="0" lvl="0" indent="0" algn="l" defTabSz="914400" rtl="0" eaLnBrk="1" fontAlgn="auto" latinLnBrk="0" hangingPunct="1">
+                        <a:lnSpc>
+                          <a:spcPct val="100000"/>
+                        </a:lnSpc>
+                        <a:spcBef>
+                          <a:spcPts val="0"/>
+                        </a:spcBef>
+                        <a:spcAft>
+                          <a:spcPts val="0"/>
+                        </a:spcAft>
+                        <a:buClrTx/>
+                        <a:buSzTx/>
+                        <a:buFontTx/>
+                        <a:buNone/>
+                        <a:tabLst/>
+                        <a:defRPr/>
+                      </a:pPr>
+                      <a:r>
+                        <a:rPr lang="en-US" sz="1200" dirty="0"/>
+                        <a:t>school TEXT</a:t>
+                      </a:r>
+                    </a:p>
+                  </a:txBody>
+                  <a:tcPr/>
+                </a:tc>
+                <a:extLst>
+                  <a:ext uri="{0D108BD9-81ED-4DB2-BD59-A6C34878D82A}">
+                    <a16:rowId xmlns:a16="http://schemas.microsoft.com/office/drawing/2014/main" val="3654588946"/>
+                  </a:ext>
+                </a:extLst>
+              </a:tr>
+              <a:tr h="194776">
+                <a:tc>
+                  <a:txBody>
+                    <a:bodyPr/>
+                    <a:lstStyle/>
+                    <a:p>
+                      <a:endParaRPr lang="en-US" sz="1200" dirty="0"/>
+                    </a:p>
+                  </a:txBody>
+                  <a:tcPr/>
+                </a:tc>
+                <a:tc>
+                  <a:txBody>
+                    <a:bodyPr/>
+                    <a:lstStyle/>
+                    <a:p>
+                      <a:pPr marL="0" marR="0" lvl="0" indent="0" algn="l" defTabSz="914400" rtl="0" eaLnBrk="1" fontAlgn="auto" latinLnBrk="0" hangingPunct="1">
+                        <a:lnSpc>
+                          <a:spcPct val="100000"/>
+                        </a:lnSpc>
+                        <a:spcBef>
+                          <a:spcPts val="0"/>
+                        </a:spcBef>
+                        <a:spcAft>
+                          <a:spcPts val="0"/>
+                        </a:spcAft>
+                        <a:buClrTx/>
+                        <a:buSzTx/>
+                        <a:buFontTx/>
+                        <a:buNone/>
+                        <a:tabLst/>
+                        <a:defRPr/>
+                      </a:pPr>
+                      <a:r>
+                        <a:rPr lang="en-US" sz="1200" dirty="0"/>
+                        <a:t>range TEXT NOT NULL</a:t>
+                      </a:r>
+                    </a:p>
+                  </a:txBody>
+                  <a:tcPr/>
+                </a:tc>
+                <a:extLst>
+                  <a:ext uri="{0D108BD9-81ED-4DB2-BD59-A6C34878D82A}">
+                    <a16:rowId xmlns:a16="http://schemas.microsoft.com/office/drawing/2014/main" val="2295182695"/>
                   </a:ext>
                 </a:extLst>
               </a:tr>
@@ -3533,7 +3721,7 @@
                 </a:tc>
                 <a:extLst>
                   <a:ext uri="{0D108BD9-81ED-4DB2-BD59-A6C34878D82A}">
-                    <a16:rowId xmlns:a16="http://schemas.microsoft.com/office/drawing/2014/main" val="3143660726"/>
+                    <a16:rowId xmlns:a16="http://schemas.microsoft.com/office/drawing/2014/main" val="2725860931"/>
                   </a:ext>
                 </a:extLst>
               </a:tr>
@@ -3563,7 +3751,7 @@
                 </a:tc>
                 <a:extLst>
                   <a:ext uri="{0D108BD9-81ED-4DB2-BD59-A6C34878D82A}">
-                    <a16:rowId xmlns:a16="http://schemas.microsoft.com/office/drawing/2014/main" val="106472998"/>
+                    <a16:rowId xmlns:a16="http://schemas.microsoft.com/office/drawing/2014/main" val="2768110349"/>
                   </a:ext>
                 </a:extLst>
               </a:tr>
@@ -3583,9 +3771,30 @@
                     <a:bodyPr/>
                     <a:lstStyle/>
                     <a:p>
+                      <a:pPr marL="0" marR="0" lvl="0" indent="0" algn="l" defTabSz="914400" rtl="0" eaLnBrk="1" fontAlgn="auto" latinLnBrk="0" hangingPunct="1">
+                        <a:lnSpc>
+                          <a:spcPct val="100000"/>
+                        </a:lnSpc>
+                        <a:spcBef>
+                          <a:spcPts val="0"/>
+                        </a:spcBef>
+                        <a:spcAft>
+                          <a:spcPts val="0"/>
+                        </a:spcAft>
+                        <a:buClrTx/>
+                        <a:buSzTx/>
+                        <a:buFontTx/>
+                        <a:buNone/>
+                        <a:tabLst/>
+                        <a:defRPr/>
+                      </a:pPr>
+                      <a:r>
+                        <a:rPr lang="en-US" sz="1200" dirty="0" err="1"/>
+                        <a:t>upcast_effect</a:t>
+                      </a:r>
                       <a:r>
                         <a:rPr lang="en-US" sz="1200" dirty="0"/>
-                        <a:t>duration TEXT NOT NULL</a:t>
+                        <a:t> TEXT</a:t>
                       </a:r>
                     </a:p>
                   </a:txBody>
@@ -3593,97 +3802,7 @@
                 </a:tc>
                 <a:extLst>
                   <a:ext uri="{0D108BD9-81ED-4DB2-BD59-A6C34878D82A}">
-                    <a16:rowId xmlns:a16="http://schemas.microsoft.com/office/drawing/2014/main" val="3654588946"/>
-                  </a:ext>
-                </a:extLst>
-              </a:tr>
-              <a:tr h="194776">
-                <a:tc>
-                  <a:txBody>
-                    <a:bodyPr/>
-                    <a:lstStyle/>
-                    <a:p>
-                      <a:endParaRPr lang="en-US" sz="1200" dirty="0"/>
-                    </a:p>
-                  </a:txBody>
-                  <a:tcPr/>
-                </a:tc>
-                <a:tc>
-                  <a:txBody>
-                    <a:bodyPr/>
-                    <a:lstStyle/>
-                    <a:p>
-                      <a:r>
-                        <a:rPr lang="en-US" sz="1200" dirty="0"/>
-                        <a:t>level INT NOT NULL</a:t>
-                      </a:r>
-                    </a:p>
-                  </a:txBody>
-                  <a:tcPr/>
-                </a:tc>
-                <a:extLst>
-                  <a:ext uri="{0D108BD9-81ED-4DB2-BD59-A6C34878D82A}">
-                    <a16:rowId xmlns:a16="http://schemas.microsoft.com/office/drawing/2014/main" val="2295182695"/>
-                  </a:ext>
-                </a:extLst>
-              </a:tr>
-              <a:tr h="194776">
-                <a:tc>
-                  <a:txBody>
-                    <a:bodyPr/>
-                    <a:lstStyle/>
-                    <a:p>
-                      <a:endParaRPr lang="en-US" sz="1200" dirty="0"/>
-                    </a:p>
-                  </a:txBody>
-                  <a:tcPr/>
-                </a:tc>
-                <a:tc>
-                  <a:txBody>
-                    <a:bodyPr/>
-                    <a:lstStyle/>
-                    <a:p>
-                      <a:r>
-                        <a:rPr lang="en-US" sz="1200" dirty="0"/>
-                        <a:t>range TEXT NOT NULL</a:t>
-                      </a:r>
-                    </a:p>
-                  </a:txBody>
-                  <a:tcPr/>
-                </a:tc>
-                <a:extLst>
-                  <a:ext uri="{0D108BD9-81ED-4DB2-BD59-A6C34878D82A}">
-                    <a16:rowId xmlns:a16="http://schemas.microsoft.com/office/drawing/2014/main" val="2725860931"/>
-                  </a:ext>
-                </a:extLst>
-              </a:tr>
-              <a:tr h="194776">
-                <a:tc>
-                  <a:txBody>
-                    <a:bodyPr/>
-                    <a:lstStyle/>
-                    <a:p>
-                      <a:endParaRPr lang="en-US" sz="1200" dirty="0"/>
-                    </a:p>
-                  </a:txBody>
-                  <a:tcPr/>
-                </a:tc>
-                <a:tc>
-                  <a:txBody>
-                    <a:bodyPr/>
-                    <a:lstStyle/>
-                    <a:p>
-                      <a:r>
-                        <a:rPr lang="en-US" sz="1200" dirty="0"/>
-                        <a:t>school TEXT</a:t>
-                      </a:r>
-                    </a:p>
-                  </a:txBody>
-                  <a:tcPr/>
-                </a:tc>
-                <a:extLst>
-                  <a:ext uri="{0D108BD9-81ED-4DB2-BD59-A6C34878D82A}">
-                    <a16:rowId xmlns:a16="http://schemas.microsoft.com/office/drawing/2014/main" val="2768110349"/>
+                    <a16:rowId xmlns:a16="http://schemas.microsoft.com/office/drawing/2014/main" val="719871826"/>
                   </a:ext>
                 </a:extLst>
               </a:tr>
@@ -3713,36 +3832,6 @@
                 </a:tc>
                 <a:extLst>
                   <a:ext uri="{0D108BD9-81ED-4DB2-BD59-A6C34878D82A}">
-                    <a16:rowId xmlns:a16="http://schemas.microsoft.com/office/drawing/2014/main" val="719871826"/>
-                  </a:ext>
-                </a:extLst>
-              </a:tr>
-              <a:tr h="194776">
-                <a:tc>
-                  <a:txBody>
-                    <a:bodyPr/>
-                    <a:lstStyle/>
-                    <a:p>
-                      <a:endParaRPr lang="en-US" sz="1200" dirty="0"/>
-                    </a:p>
-                  </a:txBody>
-                  <a:tcPr/>
-                </a:tc>
-                <a:tc>
-                  <a:txBody>
-                    <a:bodyPr/>
-                    <a:lstStyle/>
-                    <a:p>
-                      <a:r>
-                        <a:rPr lang="en-US" sz="1200" dirty="0"/>
-                        <a:t>ritual BOOLEAN NOT NULL</a:t>
-                      </a:r>
-                    </a:p>
-                  </a:txBody>
-                  <a:tcPr/>
-                </a:tc>
-                <a:extLst>
-                  <a:ext uri="{0D108BD9-81ED-4DB2-BD59-A6C34878D82A}">
                     <a16:rowId xmlns:a16="http://schemas.microsoft.com/office/drawing/2014/main" val="2066696975"/>
                   </a:ext>
                 </a:extLst>
@@ -3763,13 +3852,26 @@
                     <a:bodyPr/>
                     <a:lstStyle/>
                     <a:p>
-                      <a:r>
-                        <a:rPr lang="en-US" sz="1200" dirty="0" err="1"/>
-                        <a:t>spell_type</a:t>
-                      </a:r>
+                      <a:pPr marL="0" marR="0" lvl="0" indent="0" algn="l" defTabSz="914400" rtl="0" eaLnBrk="1" fontAlgn="auto" latinLnBrk="0" hangingPunct="1">
+                        <a:lnSpc>
+                          <a:spcPct val="100000"/>
+                        </a:lnSpc>
+                        <a:spcBef>
+                          <a:spcPts val="0"/>
+                        </a:spcBef>
+                        <a:spcAft>
+                          <a:spcPts val="0"/>
+                        </a:spcAft>
+                        <a:buClrTx/>
+                        <a:buSzTx/>
+                        <a:buFontTx/>
+                        <a:buNone/>
+                        <a:tabLst/>
+                        <a:defRPr/>
+                      </a:pPr>
                       <a:r>
                         <a:rPr lang="en-US" sz="1200" dirty="0"/>
-                        <a:t> TEXT NOT NULL</a:t>
+                        <a:t>ritual BOOLEAN NOT NULL</a:t>
                       </a:r>
                     </a:p>
                   </a:txBody>
@@ -3797,13 +3899,30 @@
                     <a:bodyPr/>
                     <a:lstStyle/>
                     <a:p>
+                      <a:pPr marL="0" marR="0" lvl="0" indent="0" algn="l" defTabSz="914400" rtl="0" eaLnBrk="1" fontAlgn="auto" latinLnBrk="0" hangingPunct="1">
+                        <a:lnSpc>
+                          <a:spcPct val="100000"/>
+                        </a:lnSpc>
+                        <a:spcBef>
+                          <a:spcPts val="0"/>
+                        </a:spcBef>
+                        <a:spcAft>
+                          <a:spcPts val="0"/>
+                        </a:spcAft>
+                        <a:buClrTx/>
+                        <a:buSzTx/>
+                        <a:buFontTx/>
+                        <a:buNone/>
+                        <a:tabLst/>
+                        <a:defRPr/>
+                      </a:pPr>
                       <a:r>
                         <a:rPr lang="en-US" sz="1200" dirty="0" err="1"/>
-                        <a:t>upcast_effect</a:t>
+                        <a:t>spell_type</a:t>
                       </a:r>
                       <a:r>
                         <a:rPr lang="en-US" sz="1200" dirty="0"/>
-                        <a:t> TEXT</a:t>
+                        <a:t> TEXT NOT NULL</a:t>
                       </a:r>
                     </a:p>
                   </a:txBody>
@@ -3834,14 +3953,14 @@
           <p:nvPr>
             <p:extLst>
               <p:ext uri="{D42A27DB-BD31-4B8C-83A1-F6EECF244321}">
-                <p14:modId xmlns:p14="http://schemas.microsoft.com/office/powerpoint/2010/main" val="4266950432"/>
+                <p14:modId xmlns:p14="http://schemas.microsoft.com/office/powerpoint/2010/main" val="3556391178"/>
               </p:ext>
             </p:extLst>
           </p:nvPr>
         </p:nvGraphicFramePr>
         <p:xfrm>
           <a:off x="5282282" y="1918307"/>
-          <a:ext cx="2605195" cy="853440"/>
+          <a:ext cx="2904985" cy="853440"/>
         </p:xfrm>
         <a:graphic>
           <a:graphicData uri="http://schemas.openxmlformats.org/drawingml/2006/table">
@@ -3850,14 +3969,14 @@
                 <a:tableStyleId>{5C22544A-7EE6-4342-B048-85BDC9FD1C3A}</a:tableStyleId>
               </a:tblPr>
               <a:tblGrid>
-                <a:gridCol w="592175">
+                <a:gridCol w="660318">
                   <a:extLst>
                     <a:ext uri="{9D8B030D-6E8A-4147-A177-3AD203B41FA5}">
                       <a16:colId xmlns:a16="http://schemas.microsoft.com/office/drawing/2014/main" val="1454048853"/>
                     </a:ext>
                   </a:extLst>
                 </a:gridCol>
-                <a:gridCol w="2013020">
+                <a:gridCol w="2244667">
                   <a:extLst>
                     <a:ext uri="{9D8B030D-6E8A-4147-A177-3AD203B41FA5}">
                       <a16:colId xmlns:a16="http://schemas.microsoft.com/office/drawing/2014/main" val="3290258725"/>
@@ -3950,7 +4069,7 @@
                     <a:p>
                       <a:r>
                         <a:rPr lang="en-US" sz="1200" dirty="0"/>
-                        <a:t>effect TEXT NOT NULL</a:t>
+                        <a:t>effect TEXT UNIQUE NOT NULL</a:t>
                       </a:r>
                     </a:p>
                   </a:txBody>
@@ -4132,14 +4251,14 @@
           <p:nvPr>
             <p:extLst>
               <p:ext uri="{D42A27DB-BD31-4B8C-83A1-F6EECF244321}">
-                <p14:modId xmlns:p14="http://schemas.microsoft.com/office/powerpoint/2010/main" val="3608770633"/>
+                <p14:modId xmlns:p14="http://schemas.microsoft.com/office/powerpoint/2010/main" val="2897688338"/>
               </p:ext>
             </p:extLst>
           </p:nvPr>
         </p:nvGraphicFramePr>
         <p:xfrm>
-          <a:off x="1282700" y="4538026"/>
-          <a:ext cx="2127250" cy="874182"/>
+          <a:off x="1282699" y="4538026"/>
+          <a:ext cx="3077633" cy="874182"/>
         </p:xfrm>
         <a:graphic>
           <a:graphicData uri="http://schemas.openxmlformats.org/drawingml/2006/table">
@@ -4148,14 +4267,14 @@
                 <a:tableStyleId>{5C22544A-7EE6-4342-B048-85BDC9FD1C3A}</a:tableStyleId>
               </a:tblPr>
               <a:tblGrid>
-                <a:gridCol w="406400">
+                <a:gridCol w="587966">
                   <a:extLst>
                     <a:ext uri="{9D8B030D-6E8A-4147-A177-3AD203B41FA5}">
                       <a16:colId xmlns:a16="http://schemas.microsoft.com/office/drawing/2014/main" val="1454048853"/>
                     </a:ext>
                   </a:extLst>
                 </a:gridCol>
-                <a:gridCol w="1720850">
+                <a:gridCol w="2489667">
                   <a:extLst>
                     <a:ext uri="{9D8B030D-6E8A-4147-A177-3AD203B41FA5}">
                       <a16:colId xmlns:a16="http://schemas.microsoft.com/office/drawing/2014/main" val="3290258725"/>
@@ -4252,7 +4371,7 @@
                     <a:p>
                       <a:r>
                         <a:rPr lang="en-US" sz="1200" dirty="0" err="1"/>
-                        <a:t>class_id</a:t>
+                        <a:t>character_class_id</a:t>
                       </a:r>
                       <a:r>
                         <a:rPr lang="en-US" sz="1200" dirty="0"/>
@@ -4490,13 +4609,13 @@
         </p:nvCxnSpPr>
         <p:spPr>
           <a:xfrm rot="5400000">
-            <a:off x="4657685" y="1714077"/>
-            <a:ext cx="1255548" cy="6353"/>
+            <a:off x="4657694" y="1714068"/>
+            <a:ext cx="1255548" cy="6371"/>
           </a:xfrm>
           <a:prstGeom prst="bentConnector4">
             <a:avLst>
               <a:gd name="adj1" fmla="val -36"/>
-              <a:gd name="adj2" fmla="val 3698300"/>
+              <a:gd name="adj2" fmla="val 3688134"/>
             </a:avLst>
           </a:prstGeom>
           <a:ln>
@@ -4621,7 +4740,7 @@
         <p:spPr>
           <a:xfrm>
             <a:off x="1014413" y="4975117"/>
-            <a:ext cx="268287" cy="0"/>
+            <a:ext cx="268286" cy="0"/>
           </a:xfrm>
           <a:prstGeom prst="straightConnector1">
             <a:avLst/>

</xml_diff>

<commit_message>
Adjusted diagram and Fusion table to have fusion_name
</commit_message>
<xml_diff>
--- a/images/Spell database diagram.pptx
+++ b/images/Spell database diagram.pptx
@@ -259,7 +259,7 @@
           <a:p>
             <a:fld id="{2EA71DFD-377C-4EB5-BA3E-17FDF086A0CC}" type="datetimeFigureOut">
               <a:rPr lang="en-US" smtClean="0"/>
-              <a:t>9/5/2024</a:t>
+              <a:t>9/8/2024</a:t>
             </a:fld>
             <a:endParaRPr lang="en-US"/>
           </a:p>
@@ -457,7 +457,7 @@
           <a:p>
             <a:fld id="{2EA71DFD-377C-4EB5-BA3E-17FDF086A0CC}" type="datetimeFigureOut">
               <a:rPr lang="en-US" smtClean="0"/>
-              <a:t>9/5/2024</a:t>
+              <a:t>9/8/2024</a:t>
             </a:fld>
             <a:endParaRPr lang="en-US"/>
           </a:p>
@@ -665,7 +665,7 @@
           <a:p>
             <a:fld id="{2EA71DFD-377C-4EB5-BA3E-17FDF086A0CC}" type="datetimeFigureOut">
               <a:rPr lang="en-US" smtClean="0"/>
-              <a:t>9/5/2024</a:t>
+              <a:t>9/8/2024</a:t>
             </a:fld>
             <a:endParaRPr lang="en-US"/>
           </a:p>
@@ -863,7 +863,7 @@
           <a:p>
             <a:fld id="{2EA71DFD-377C-4EB5-BA3E-17FDF086A0CC}" type="datetimeFigureOut">
               <a:rPr lang="en-US" smtClean="0"/>
-              <a:t>9/5/2024</a:t>
+              <a:t>9/8/2024</a:t>
             </a:fld>
             <a:endParaRPr lang="en-US"/>
           </a:p>
@@ -1138,7 +1138,7 @@
           <a:p>
             <a:fld id="{2EA71DFD-377C-4EB5-BA3E-17FDF086A0CC}" type="datetimeFigureOut">
               <a:rPr lang="en-US" smtClean="0"/>
-              <a:t>9/5/2024</a:t>
+              <a:t>9/8/2024</a:t>
             </a:fld>
             <a:endParaRPr lang="en-US"/>
           </a:p>
@@ -1403,7 +1403,7 @@
           <a:p>
             <a:fld id="{2EA71DFD-377C-4EB5-BA3E-17FDF086A0CC}" type="datetimeFigureOut">
               <a:rPr lang="en-US" smtClean="0"/>
-              <a:t>9/5/2024</a:t>
+              <a:t>9/8/2024</a:t>
             </a:fld>
             <a:endParaRPr lang="en-US"/>
           </a:p>
@@ -1815,7 +1815,7 @@
           <a:p>
             <a:fld id="{2EA71DFD-377C-4EB5-BA3E-17FDF086A0CC}" type="datetimeFigureOut">
               <a:rPr lang="en-US" smtClean="0"/>
-              <a:t>9/5/2024</a:t>
+              <a:t>9/8/2024</a:t>
             </a:fld>
             <a:endParaRPr lang="en-US"/>
           </a:p>
@@ -1956,7 +1956,7 @@
           <a:p>
             <a:fld id="{2EA71DFD-377C-4EB5-BA3E-17FDF086A0CC}" type="datetimeFigureOut">
               <a:rPr lang="en-US" smtClean="0"/>
-              <a:t>9/5/2024</a:t>
+              <a:t>9/8/2024</a:t>
             </a:fld>
             <a:endParaRPr lang="en-US"/>
           </a:p>
@@ -2069,7 +2069,7 @@
           <a:p>
             <a:fld id="{2EA71DFD-377C-4EB5-BA3E-17FDF086A0CC}" type="datetimeFigureOut">
               <a:rPr lang="en-US" smtClean="0"/>
-              <a:t>9/5/2024</a:t>
+              <a:t>9/8/2024</a:t>
             </a:fld>
             <a:endParaRPr lang="en-US"/>
           </a:p>
@@ -2380,7 +2380,7 @@
           <a:p>
             <a:fld id="{2EA71DFD-377C-4EB5-BA3E-17FDF086A0CC}" type="datetimeFigureOut">
               <a:rPr lang="en-US" smtClean="0"/>
-              <a:t>9/5/2024</a:t>
+              <a:t>9/8/2024</a:t>
             </a:fld>
             <a:endParaRPr lang="en-US"/>
           </a:p>
@@ -2668,7 +2668,7 @@
           <a:p>
             <a:fld id="{2EA71DFD-377C-4EB5-BA3E-17FDF086A0CC}" type="datetimeFigureOut">
               <a:rPr lang="en-US" smtClean="0"/>
-              <a:t>9/5/2024</a:t>
+              <a:t>9/8/2024</a:t>
             </a:fld>
             <a:endParaRPr lang="en-US"/>
           </a:p>
@@ -2909,7 +2909,7 @@
           <a:p>
             <a:fld id="{2EA71DFD-377C-4EB5-BA3E-17FDF086A0CC}" type="datetimeFigureOut">
               <a:rPr lang="en-US" smtClean="0"/>
-              <a:t>9/5/2024</a:t>
+              <a:t>9/8/2024</a:t>
             </a:fld>
             <a:endParaRPr lang="en-US"/>
           </a:p>
@@ -3953,14 +3953,14 @@
           <p:nvPr>
             <p:extLst>
               <p:ext uri="{D42A27DB-BD31-4B8C-83A1-F6EECF244321}">
-                <p14:modId xmlns:p14="http://schemas.microsoft.com/office/powerpoint/2010/main" val="3556391178"/>
+                <p14:modId xmlns:p14="http://schemas.microsoft.com/office/powerpoint/2010/main" val="4001687482"/>
               </p:ext>
             </p:extLst>
           </p:nvPr>
         </p:nvGraphicFramePr>
         <p:xfrm>
-          <a:off x="5282282" y="1918307"/>
-          <a:ext cx="2904985" cy="853440"/>
+          <a:off x="5282280" y="1918307"/>
+          <a:ext cx="3590787" cy="1127760"/>
         </p:xfrm>
         <a:graphic>
           <a:graphicData uri="http://schemas.openxmlformats.org/drawingml/2006/table">
@@ -3969,14 +3969,14 @@
                 <a:tableStyleId>{5C22544A-7EE6-4342-B048-85BDC9FD1C3A}</a:tableStyleId>
               </a:tblPr>
               <a:tblGrid>
-                <a:gridCol w="660318">
+                <a:gridCol w="816205">
                   <a:extLst>
                     <a:ext uri="{9D8B030D-6E8A-4147-A177-3AD203B41FA5}">
                       <a16:colId xmlns:a16="http://schemas.microsoft.com/office/drawing/2014/main" val="1454048853"/>
                     </a:ext>
                   </a:extLst>
                 </a:gridCol>
-                <a:gridCol w="2244667">
+                <a:gridCol w="2774582">
                   <a:extLst>
                     <a:ext uri="{9D8B030D-6E8A-4147-A177-3AD203B41FA5}">
                       <a16:colId xmlns:a16="http://schemas.microsoft.com/office/drawing/2014/main" val="3290258725"/>
@@ -4068,6 +4068,57 @@
                     <a:lstStyle/>
                     <a:p>
                       <a:r>
+                        <a:rPr lang="en-US" sz="1200" dirty="0" err="1"/>
+                        <a:t>fusion_name</a:t>
+                      </a:r>
+                      <a:r>
+                        <a:rPr lang="en-US" sz="1200" dirty="0"/>
+                        <a:t> TEXT UNIQUE NOT NULL</a:t>
+                      </a:r>
+                    </a:p>
+                  </a:txBody>
+                  <a:tcPr/>
+                </a:tc>
+                <a:extLst>
+                  <a:ext uri="{0D108BD9-81ED-4DB2-BD59-A6C34878D82A}">
+                    <a16:rowId xmlns:a16="http://schemas.microsoft.com/office/drawing/2014/main" val="1136051870"/>
+                  </a:ext>
+                </a:extLst>
+              </a:tr>
+              <a:tr h="170745">
+                <a:tc>
+                  <a:txBody>
+                    <a:bodyPr/>
+                    <a:lstStyle/>
+                    <a:p>
+                      <a:endParaRPr lang="en-US" sz="1200" dirty="0"/>
+                    </a:p>
+                  </a:txBody>
+                  <a:tcPr/>
+                </a:tc>
+                <a:tc>
+                  <a:txBody>
+                    <a:bodyPr/>
+                    <a:lstStyle/>
+                    <a:p>
+                      <a:pPr marL="0" marR="0" lvl="0" indent="0" algn="l" defTabSz="914400" rtl="0" eaLnBrk="1" fontAlgn="auto" latinLnBrk="0" hangingPunct="1">
+                        <a:lnSpc>
+                          <a:spcPct val="100000"/>
+                        </a:lnSpc>
+                        <a:spcBef>
+                          <a:spcPts val="0"/>
+                        </a:spcBef>
+                        <a:spcAft>
+                          <a:spcPts val="0"/>
+                        </a:spcAft>
+                        <a:buClrTx/>
+                        <a:buSzTx/>
+                        <a:buFontTx/>
+                        <a:buNone/>
+                        <a:tabLst/>
+                        <a:defRPr/>
+                      </a:pPr>
+                      <a:r>
                         <a:rPr lang="en-US" sz="1200" dirty="0"/>
                         <a:t>effect TEXT UNIQUE NOT NULL</a:t>
                       </a:r>
@@ -4077,7 +4128,7 @@
                 </a:tc>
                 <a:extLst>
                   <a:ext uri="{0D108BD9-81ED-4DB2-BD59-A6C34878D82A}">
-                    <a16:rowId xmlns:a16="http://schemas.microsoft.com/office/drawing/2014/main" val="1136051870"/>
+                    <a16:rowId xmlns:a16="http://schemas.microsoft.com/office/drawing/2014/main" val="3917895233"/>
                   </a:ext>
                 </a:extLst>
               </a:tr>
@@ -4609,13 +4660,13 @@
         </p:nvCxnSpPr>
         <p:spPr>
           <a:xfrm rot="5400000">
-            <a:off x="4657694" y="1714068"/>
-            <a:ext cx="1255548" cy="6371"/>
+            <a:off x="4589120" y="1782640"/>
+            <a:ext cx="1392708" cy="6387"/>
           </a:xfrm>
           <a:prstGeom prst="bentConnector4">
             <a:avLst>
-              <a:gd name="adj1" fmla="val -36"/>
-              <a:gd name="adj2" fmla="val 3688134"/>
+              <a:gd name="adj1" fmla="val -33"/>
+              <a:gd name="adj2" fmla="val 3679145"/>
             </a:avLst>
           </a:prstGeom>
           <a:ln>

</xml_diff>

<commit_message>
Add composite keys to junction tables, ON DELETE CASCADE, update ERD
</commit_message>
<xml_diff>
--- a/images/Spell database diagram.pptx
+++ b/images/Spell database diagram.pptx
@@ -259,7 +259,7 @@
           <a:p>
             <a:fld id="{2EA71DFD-377C-4EB5-BA3E-17FDF086A0CC}" type="datetimeFigureOut">
               <a:rPr lang="en-US" smtClean="0"/>
-              <a:t>9/8/2024</a:t>
+              <a:t>9/12/2024</a:t>
             </a:fld>
             <a:endParaRPr lang="en-US"/>
           </a:p>
@@ -457,7 +457,7 @@
           <a:p>
             <a:fld id="{2EA71DFD-377C-4EB5-BA3E-17FDF086A0CC}" type="datetimeFigureOut">
               <a:rPr lang="en-US" smtClean="0"/>
-              <a:t>9/8/2024</a:t>
+              <a:t>9/12/2024</a:t>
             </a:fld>
             <a:endParaRPr lang="en-US"/>
           </a:p>
@@ -665,7 +665,7 @@
           <a:p>
             <a:fld id="{2EA71DFD-377C-4EB5-BA3E-17FDF086A0CC}" type="datetimeFigureOut">
               <a:rPr lang="en-US" smtClean="0"/>
-              <a:t>9/8/2024</a:t>
+              <a:t>9/12/2024</a:t>
             </a:fld>
             <a:endParaRPr lang="en-US"/>
           </a:p>
@@ -863,7 +863,7 @@
           <a:p>
             <a:fld id="{2EA71DFD-377C-4EB5-BA3E-17FDF086A0CC}" type="datetimeFigureOut">
               <a:rPr lang="en-US" smtClean="0"/>
-              <a:t>9/8/2024</a:t>
+              <a:t>9/12/2024</a:t>
             </a:fld>
             <a:endParaRPr lang="en-US"/>
           </a:p>
@@ -1138,7 +1138,7 @@
           <a:p>
             <a:fld id="{2EA71DFD-377C-4EB5-BA3E-17FDF086A0CC}" type="datetimeFigureOut">
               <a:rPr lang="en-US" smtClean="0"/>
-              <a:t>9/8/2024</a:t>
+              <a:t>9/12/2024</a:t>
             </a:fld>
             <a:endParaRPr lang="en-US"/>
           </a:p>
@@ -1403,7 +1403,7 @@
           <a:p>
             <a:fld id="{2EA71DFD-377C-4EB5-BA3E-17FDF086A0CC}" type="datetimeFigureOut">
               <a:rPr lang="en-US" smtClean="0"/>
-              <a:t>9/8/2024</a:t>
+              <a:t>9/12/2024</a:t>
             </a:fld>
             <a:endParaRPr lang="en-US"/>
           </a:p>
@@ -1815,7 +1815,7 @@
           <a:p>
             <a:fld id="{2EA71DFD-377C-4EB5-BA3E-17FDF086A0CC}" type="datetimeFigureOut">
               <a:rPr lang="en-US" smtClean="0"/>
-              <a:t>9/8/2024</a:t>
+              <a:t>9/12/2024</a:t>
             </a:fld>
             <a:endParaRPr lang="en-US"/>
           </a:p>
@@ -1956,7 +1956,7 @@
           <a:p>
             <a:fld id="{2EA71DFD-377C-4EB5-BA3E-17FDF086A0CC}" type="datetimeFigureOut">
               <a:rPr lang="en-US" smtClean="0"/>
-              <a:t>9/8/2024</a:t>
+              <a:t>9/12/2024</a:t>
             </a:fld>
             <a:endParaRPr lang="en-US"/>
           </a:p>
@@ -2069,7 +2069,7 @@
           <a:p>
             <a:fld id="{2EA71DFD-377C-4EB5-BA3E-17FDF086A0CC}" type="datetimeFigureOut">
               <a:rPr lang="en-US" smtClean="0"/>
-              <a:t>9/8/2024</a:t>
+              <a:t>9/12/2024</a:t>
             </a:fld>
             <a:endParaRPr lang="en-US"/>
           </a:p>
@@ -2380,7 +2380,7 @@
           <a:p>
             <a:fld id="{2EA71DFD-377C-4EB5-BA3E-17FDF086A0CC}" type="datetimeFigureOut">
               <a:rPr lang="en-US" smtClean="0"/>
-              <a:t>9/8/2024</a:t>
+              <a:t>9/12/2024</a:t>
             </a:fld>
             <a:endParaRPr lang="en-US"/>
           </a:p>
@@ -2668,7 +2668,7 @@
           <a:p>
             <a:fld id="{2EA71DFD-377C-4EB5-BA3E-17FDF086A0CC}" type="datetimeFigureOut">
               <a:rPr lang="en-US" smtClean="0"/>
-              <a:t>9/8/2024</a:t>
+              <a:t>9/12/2024</a:t>
             </a:fld>
             <a:endParaRPr lang="en-US"/>
           </a:p>
@@ -2909,7 +2909,7 @@
           <a:p>
             <a:fld id="{2EA71DFD-377C-4EB5-BA3E-17FDF086A0CC}" type="datetimeFigureOut">
               <a:rPr lang="en-US" smtClean="0"/>
-              <a:t>9/8/2024</a:t>
+              <a:t>9/12/2024</a:t>
             </a:fld>
             <a:endParaRPr lang="en-US"/>
           </a:p>
@@ -3341,7 +3341,7 @@
           <p:nvPr>
             <p:extLst>
               <p:ext uri="{D42A27DB-BD31-4B8C-83A1-F6EECF244321}">
-                <p14:modId xmlns:p14="http://schemas.microsoft.com/office/powerpoint/2010/main" val="3923719173"/>
+                <p14:modId xmlns:p14="http://schemas.microsoft.com/office/powerpoint/2010/main" val="895617765"/>
               </p:ext>
             </p:extLst>
           </p:nvPr>
@@ -3743,7 +3743,7 @@
                     <a:p>
                       <a:r>
                         <a:rPr lang="en-US" sz="1200" dirty="0"/>
-                        <a:t>description TEXT NOT NULL</a:t>
+                        <a:t>description TEXT UNIQUE NOT NULL</a:t>
                       </a:r>
                     </a:p>
                   </a:txBody>
@@ -3953,14 +3953,14 @@
           <p:nvPr>
             <p:extLst>
               <p:ext uri="{D42A27DB-BD31-4B8C-83A1-F6EECF244321}">
-                <p14:modId xmlns:p14="http://schemas.microsoft.com/office/powerpoint/2010/main" val="4001687482"/>
+                <p14:modId xmlns:p14="http://schemas.microsoft.com/office/powerpoint/2010/main" val="4151321825"/>
               </p:ext>
             </p:extLst>
           </p:nvPr>
         </p:nvGraphicFramePr>
         <p:xfrm>
           <a:off x="5282280" y="1918307"/>
-          <a:ext cx="3590787" cy="1127760"/>
+          <a:ext cx="3260587" cy="1127760"/>
         </p:xfrm>
         <a:graphic>
           <a:graphicData uri="http://schemas.openxmlformats.org/drawingml/2006/table">
@@ -3969,14 +3969,14 @@
                 <a:tableStyleId>{5C22544A-7EE6-4342-B048-85BDC9FD1C3A}</a:tableStyleId>
               </a:tblPr>
               <a:tblGrid>
-                <a:gridCol w="816205">
+                <a:gridCol w="446745">
                   <a:extLst>
                     <a:ext uri="{9D8B030D-6E8A-4147-A177-3AD203B41FA5}">
                       <a16:colId xmlns:a16="http://schemas.microsoft.com/office/drawing/2014/main" val="1454048853"/>
                     </a:ext>
                   </a:extLst>
                 </a:gridCol>
-                <a:gridCol w="2774582">
+                <a:gridCol w="2813842">
                   <a:extLst>
                     <a:ext uri="{9D8B030D-6E8A-4147-A177-3AD203B41FA5}">
                       <a16:colId xmlns:a16="http://schemas.microsoft.com/office/drawing/2014/main" val="3290258725"/>
@@ -4151,14 +4151,14 @@
           <p:nvPr>
             <p:extLst>
               <p:ext uri="{D42A27DB-BD31-4B8C-83A1-F6EECF244321}">
-                <p14:modId xmlns:p14="http://schemas.microsoft.com/office/powerpoint/2010/main" val="537924348"/>
+                <p14:modId xmlns:p14="http://schemas.microsoft.com/office/powerpoint/2010/main" val="4199792083"/>
               </p:ext>
             </p:extLst>
           </p:nvPr>
         </p:nvGraphicFramePr>
         <p:xfrm>
-          <a:off x="1263649" y="5699017"/>
-          <a:ext cx="3172883" cy="853440"/>
+          <a:off x="1263650" y="5699017"/>
+          <a:ext cx="2944284" cy="853440"/>
         </p:xfrm>
         <a:graphic>
           <a:graphicData uri="http://schemas.openxmlformats.org/drawingml/2006/table">
@@ -4167,14 +4167,14 @@
                 <a:tableStyleId>{5C22544A-7EE6-4342-B048-85BDC9FD1C3A}</a:tableStyleId>
               </a:tblPr>
               <a:tblGrid>
-                <a:gridCol w="721213">
+                <a:gridCol w="430153">
                   <a:extLst>
                     <a:ext uri="{9D8B030D-6E8A-4147-A177-3AD203B41FA5}">
                       <a16:colId xmlns:a16="http://schemas.microsoft.com/office/drawing/2014/main" val="1454048853"/>
                     </a:ext>
                   </a:extLst>
                 </a:gridCol>
-                <a:gridCol w="2451670">
+                <a:gridCol w="2514131">
                   <a:extLst>
                     <a:ext uri="{9D8B030D-6E8A-4147-A177-3AD203B41FA5}">
                       <a16:colId xmlns:a16="http://schemas.microsoft.com/office/drawing/2014/main" val="3290258725"/>
@@ -4302,14 +4302,14 @@
           <p:nvPr>
             <p:extLst>
               <p:ext uri="{D42A27DB-BD31-4B8C-83A1-F6EECF244321}">
-                <p14:modId xmlns:p14="http://schemas.microsoft.com/office/powerpoint/2010/main" val="2897688338"/>
+                <p14:modId xmlns:p14="http://schemas.microsoft.com/office/powerpoint/2010/main" val="1087539848"/>
               </p:ext>
             </p:extLst>
           </p:nvPr>
         </p:nvGraphicFramePr>
         <p:xfrm>
           <a:off x="1282699" y="4538026"/>
-          <a:ext cx="3077633" cy="874182"/>
+          <a:ext cx="3292860" cy="874182"/>
         </p:xfrm>
         <a:graphic>
           <a:graphicData uri="http://schemas.openxmlformats.org/drawingml/2006/table">
@@ -4318,14 +4318,14 @@
                 <a:tableStyleId>{5C22544A-7EE6-4342-B048-85BDC9FD1C3A}</a:tableStyleId>
               </a:tblPr>
               <a:tblGrid>
-                <a:gridCol w="587966">
+                <a:gridCol w="690034">
                   <a:extLst>
                     <a:ext uri="{9D8B030D-6E8A-4147-A177-3AD203B41FA5}">
                       <a16:colId xmlns:a16="http://schemas.microsoft.com/office/drawing/2014/main" val="1454048853"/>
                     </a:ext>
                   </a:extLst>
                 </a:gridCol>
-                <a:gridCol w="2489667">
+                <a:gridCol w="2602826">
                   <a:extLst>
                     <a:ext uri="{9D8B030D-6E8A-4147-A177-3AD203B41FA5}">
                       <a16:colId xmlns:a16="http://schemas.microsoft.com/office/drawing/2014/main" val="3290258725"/>
@@ -4372,7 +4372,7 @@
                     <a:p>
                       <a:r>
                         <a:rPr lang="en-US" sz="1200" dirty="0"/>
-                        <a:t>FK</a:t>
+                        <a:t>PK, FK</a:t>
                       </a:r>
                     </a:p>
                   </a:txBody>
@@ -4409,7 +4409,7 @@
                     <a:p>
                       <a:r>
                         <a:rPr lang="en-US" sz="1200" dirty="0"/>
-                        <a:t>FK</a:t>
+                        <a:t>PK, FK</a:t>
                       </a:r>
                     </a:p>
                   </a:txBody>
@@ -4614,13 +4614,13 @@
         </p:nvCxnSpPr>
         <p:spPr>
           <a:xfrm rot="5400000">
-            <a:off x="840405" y="5702479"/>
-            <a:ext cx="846503" cy="13"/>
+            <a:off x="840407" y="5702477"/>
+            <a:ext cx="846504" cy="17"/>
           </a:xfrm>
           <a:prstGeom prst="bentConnector4">
             <a:avLst>
-              <a:gd name="adj1" fmla="val 789"/>
-              <a:gd name="adj2" fmla="val 1758561538"/>
+              <a:gd name="adj1" fmla="val 24795"/>
+              <a:gd name="adj2" fmla="val 1344805882"/>
             </a:avLst>
           </a:prstGeom>
           <a:ln>
@@ -4660,13 +4660,13 @@
         </p:nvCxnSpPr>
         <p:spPr>
           <a:xfrm rot="5400000">
-            <a:off x="4589120" y="1782640"/>
-            <a:ext cx="1392708" cy="6387"/>
+            <a:off x="4589121" y="1782639"/>
+            <a:ext cx="1392708" cy="6389"/>
           </a:xfrm>
           <a:prstGeom prst="bentConnector4">
             <a:avLst>
-              <a:gd name="adj1" fmla="val -33"/>
-              <a:gd name="adj2" fmla="val 3679145"/>
+              <a:gd name="adj1" fmla="val 29756"/>
+              <a:gd name="adj2" fmla="val 3678025"/>
             </a:avLst>
           </a:prstGeom>
           <a:ln>

</xml_diff>

<commit_message>
Reorganized database for links and xyz to have tables
Links and XYZ now have their own tables and junction tables to the Class table. spell_type has been removed from the Spell table. Added radius to Void Vacuum's succ effect. Add default class keys to add_XYZ instead of associating with all classes by default.
</commit_message>
<xml_diff>
--- a/images/Spell database diagram.pptx
+++ b/images/Spell database diagram.pptx
@@ -3341,14 +3341,14 @@
           <p:nvPr>
             <p:extLst>
               <p:ext uri="{D42A27DB-BD31-4B8C-83A1-F6EECF244321}">
-                <p14:modId xmlns:p14="http://schemas.microsoft.com/office/powerpoint/2010/main" val="895617765"/>
+                <p14:modId xmlns:p14="http://schemas.microsoft.com/office/powerpoint/2010/main" val="2044342773"/>
               </p:ext>
             </p:extLst>
           </p:nvPr>
         </p:nvGraphicFramePr>
         <p:xfrm>
-          <a:off x="1257298" y="372536"/>
-          <a:ext cx="3423571" cy="3870960"/>
+          <a:off x="4795598" y="221984"/>
+          <a:ext cx="2600803" cy="3221412"/>
         </p:xfrm>
         <a:graphic>
           <a:graphicData uri="http://schemas.openxmlformats.org/drawingml/2006/table">
@@ -3357,14 +3357,14 @@
                 <a:tableStyleId>{5C22544A-7EE6-4342-B048-85BDC9FD1C3A}</a:tableStyleId>
               </a:tblPr>
               <a:tblGrid>
-                <a:gridCol w="447885">
+                <a:gridCol w="340247">
                   <a:extLst>
                     <a:ext uri="{9D8B030D-6E8A-4147-A177-3AD203B41FA5}">
                       <a16:colId xmlns:a16="http://schemas.microsoft.com/office/drawing/2014/main" val="1454048853"/>
                     </a:ext>
                   </a:extLst>
                 </a:gridCol>
-                <a:gridCol w="2975686">
+                <a:gridCol w="2260556">
                   <a:extLst>
                     <a:ext uri="{9D8B030D-6E8A-4147-A177-3AD203B41FA5}">
                       <a16:colId xmlns:a16="http://schemas.microsoft.com/office/drawing/2014/main" val="3290258725"/>
@@ -3379,7 +3379,7 @@
                     <a:lstStyle/>
                     <a:p>
                       <a:r>
-                        <a:rPr lang="en-US" sz="1400" dirty="0"/>
+                        <a:rPr lang="en-US" sz="1200" dirty="0"/>
                         <a:t>Spell</a:t>
                       </a:r>
                     </a:p>
@@ -3409,7 +3409,7 @@
                     <a:lstStyle/>
                     <a:p>
                       <a:r>
-                        <a:rPr lang="en-US" sz="1200" dirty="0"/>
+                        <a:rPr lang="en-US" sz="1000" dirty="0"/>
                         <a:t>PK</a:t>
                       </a:r>
                     </a:p>
@@ -3422,11 +3422,11 @@
                     <a:lstStyle/>
                     <a:p>
                       <a:r>
-                        <a:rPr lang="en-US" sz="1200" dirty="0" err="1"/>
+                        <a:rPr lang="en-US" sz="1000" dirty="0" err="1"/>
                         <a:t>spell_id</a:t>
                       </a:r>
                       <a:r>
-                        <a:rPr lang="en-US" sz="1200" dirty="0"/>
+                        <a:rPr lang="en-US" sz="1000" dirty="0"/>
                         <a:t> INT NOT NULL</a:t>
                       </a:r>
                     </a:p>
@@ -3445,22 +3445,22 @@
                     <a:bodyPr/>
                     <a:lstStyle/>
                     <a:p>
-                      <a:endParaRPr lang="en-US" sz="1200" dirty="0"/>
-                    </a:p>
-                  </a:txBody>
-                  <a:tcPr/>
-                </a:tc>
-                <a:tc>
-                  <a:txBody>
-                    <a:bodyPr/>
-                    <a:lstStyle/>
-                    <a:p>
-                      <a:r>
-                        <a:rPr lang="en-US" sz="1200" dirty="0" err="1"/>
+                      <a:endParaRPr lang="en-US" sz="1000" dirty="0"/>
+                    </a:p>
+                  </a:txBody>
+                  <a:tcPr/>
+                </a:tc>
+                <a:tc>
+                  <a:txBody>
+                    <a:bodyPr/>
+                    <a:lstStyle/>
+                    <a:p>
+                      <a:r>
+                        <a:rPr lang="en-US" sz="1000" dirty="0" err="1"/>
                         <a:t>spell_name</a:t>
                       </a:r>
                       <a:r>
-                        <a:rPr lang="en-US" sz="1200" dirty="0"/>
+                        <a:rPr lang="en-US" sz="1000" dirty="0"/>
                         <a:t> TEXT UNIQUE NOT NULL</a:t>
                       </a:r>
                     </a:p>
@@ -3479,7 +3479,7 @@
                     <a:bodyPr/>
                     <a:lstStyle/>
                     <a:p>
-                      <a:endParaRPr lang="en-US" sz="1200" dirty="0"/>
+                      <a:endParaRPr lang="en-US" sz="1000" dirty="0"/>
                     </a:p>
                   </a:txBody>
                   <a:tcPr/>
@@ -3507,7 +3507,7 @@
                         <a:defRPr/>
                       </a:pPr>
                       <a:r>
-                        <a:rPr lang="en-US" sz="1200" dirty="0"/>
+                        <a:rPr lang="en-US" sz="1000" dirty="0"/>
                         <a:t>level INT NOT NULL</a:t>
                       </a:r>
                     </a:p>
@@ -3526,22 +3526,22 @@
                     <a:bodyPr/>
                     <a:lstStyle/>
                     <a:p>
-                      <a:endParaRPr lang="en-US" sz="1200" dirty="0"/>
-                    </a:p>
-                  </a:txBody>
-                  <a:tcPr/>
-                </a:tc>
-                <a:tc>
-                  <a:txBody>
-                    <a:bodyPr/>
-                    <a:lstStyle/>
-                    <a:p>
-                      <a:r>
-                        <a:rPr lang="en-US" sz="1200" dirty="0" err="1"/>
+                      <a:endParaRPr lang="en-US" sz="1000" dirty="0"/>
+                    </a:p>
+                  </a:txBody>
+                  <a:tcPr/>
+                </a:tc>
+                <a:tc>
+                  <a:txBody>
+                    <a:bodyPr/>
+                    <a:lstStyle/>
+                    <a:p>
+                      <a:r>
+                        <a:rPr lang="en-US" sz="1000" dirty="0" err="1"/>
                         <a:t>casting_time</a:t>
                       </a:r>
                       <a:r>
-                        <a:rPr lang="en-US" sz="1200" dirty="0"/>
+                        <a:rPr lang="en-US" sz="1000" dirty="0"/>
                         <a:t> TEXT NOT NULL</a:t>
                       </a:r>
                     </a:p>
@@ -3560,7 +3560,7 @@
                     <a:bodyPr/>
                     <a:lstStyle/>
                     <a:p>
-                      <a:endParaRPr lang="en-US" sz="1200" dirty="0"/>
+                      <a:endParaRPr lang="en-US" sz="1000" dirty="0"/>
                     </a:p>
                   </a:txBody>
                   <a:tcPr/>
@@ -3588,7 +3588,7 @@
                         <a:defRPr/>
                       </a:pPr>
                       <a:r>
-                        <a:rPr lang="en-US" sz="1200" dirty="0"/>
+                        <a:rPr lang="en-US" sz="1000" dirty="0"/>
                         <a:t>duration TEXT NOT NULL</a:t>
                       </a:r>
                     </a:p>
@@ -3607,7 +3607,7 @@
                     <a:bodyPr/>
                     <a:lstStyle/>
                     <a:p>
-                      <a:endParaRPr lang="en-US" sz="1200" dirty="0"/>
+                      <a:endParaRPr lang="en-US" sz="1000" dirty="0"/>
                     </a:p>
                   </a:txBody>
                   <a:tcPr/>
@@ -3635,8 +3635,8 @@
                         <a:defRPr/>
                       </a:pPr>
                       <a:r>
-                        <a:rPr lang="en-US" sz="1200" dirty="0"/>
-                        <a:t>school TEXT</a:t>
+                        <a:rPr lang="en-US" sz="1000" dirty="0"/>
+                        <a:t>school TEXT NOT NULL</a:t>
                       </a:r>
                     </a:p>
                   </a:txBody>
@@ -3654,7 +3654,7 @@
                     <a:bodyPr/>
                     <a:lstStyle/>
                     <a:p>
-                      <a:endParaRPr lang="en-US" sz="1200" dirty="0"/>
+                      <a:endParaRPr lang="en-US" sz="1000" dirty="0"/>
                     </a:p>
                   </a:txBody>
                   <a:tcPr/>
@@ -3682,7 +3682,7 @@
                         <a:defRPr/>
                       </a:pPr>
                       <a:r>
-                        <a:rPr lang="en-US" sz="1200" dirty="0"/>
+                        <a:rPr lang="en-US" sz="1000" dirty="0"/>
                         <a:t>range TEXT NOT NULL</a:t>
                       </a:r>
                     </a:p>
@@ -3701,19 +3701,19 @@
                     <a:bodyPr/>
                     <a:lstStyle/>
                     <a:p>
-                      <a:endParaRPr lang="en-US" sz="1200" dirty="0"/>
-                    </a:p>
-                  </a:txBody>
-                  <a:tcPr/>
-                </a:tc>
-                <a:tc>
-                  <a:txBody>
-                    <a:bodyPr/>
-                    <a:lstStyle/>
-                    <a:p>
-                      <a:r>
-                        <a:rPr lang="en-US" sz="1200" dirty="0"/>
-                        <a:t>components TEXT</a:t>
+                      <a:endParaRPr lang="en-US" sz="1000" dirty="0"/>
+                    </a:p>
+                  </a:txBody>
+                  <a:tcPr/>
+                </a:tc>
+                <a:tc>
+                  <a:txBody>
+                    <a:bodyPr/>
+                    <a:lstStyle/>
+                    <a:p>
+                      <a:r>
+                        <a:rPr lang="en-US" sz="1000" dirty="0"/>
+                        <a:t>components TEXT NOT NULL</a:t>
                       </a:r>
                     </a:p>
                   </a:txBody>
@@ -3731,18 +3731,18 @@
                     <a:bodyPr/>
                     <a:lstStyle/>
                     <a:p>
-                      <a:endParaRPr lang="en-US" sz="1200" dirty="0"/>
-                    </a:p>
-                  </a:txBody>
-                  <a:tcPr/>
-                </a:tc>
-                <a:tc>
-                  <a:txBody>
-                    <a:bodyPr/>
-                    <a:lstStyle/>
-                    <a:p>
-                      <a:r>
-                        <a:rPr lang="en-US" sz="1200" dirty="0"/>
+                      <a:endParaRPr lang="en-US" sz="1000" dirty="0"/>
+                    </a:p>
+                  </a:txBody>
+                  <a:tcPr/>
+                </a:tc>
+                <a:tc>
+                  <a:txBody>
+                    <a:bodyPr/>
+                    <a:lstStyle/>
+                    <a:p>
+                      <a:r>
+                        <a:rPr lang="en-US" sz="1000" dirty="0"/>
                         <a:t>description TEXT UNIQUE NOT NULL</a:t>
                       </a:r>
                     </a:p>
@@ -3761,7 +3761,7 @@
                     <a:bodyPr/>
                     <a:lstStyle/>
                     <a:p>
-                      <a:endParaRPr lang="en-US" sz="1200" dirty="0"/>
+                      <a:endParaRPr lang="en-US" sz="1000" dirty="0"/>
                     </a:p>
                   </a:txBody>
                   <a:tcPr/>
@@ -3789,11 +3789,11 @@
                         <a:defRPr/>
                       </a:pPr>
                       <a:r>
-                        <a:rPr lang="en-US" sz="1200" dirty="0" err="1"/>
+                        <a:rPr lang="en-US" sz="1000" dirty="0" err="1"/>
                         <a:t>upcast_effect</a:t>
                       </a:r>
                       <a:r>
-                        <a:rPr lang="en-US" sz="1200" dirty="0"/>
+                        <a:rPr lang="en-US" sz="1000" dirty="0"/>
                         <a:t> TEXT</a:t>
                       </a:r>
                     </a:p>
@@ -3812,18 +3812,18 @@
                     <a:bodyPr/>
                     <a:lstStyle/>
                     <a:p>
-                      <a:endParaRPr lang="en-US" sz="1200" dirty="0"/>
-                    </a:p>
-                  </a:txBody>
-                  <a:tcPr/>
-                </a:tc>
-                <a:tc>
-                  <a:txBody>
-                    <a:bodyPr/>
-                    <a:lstStyle/>
-                    <a:p>
-                      <a:r>
-                        <a:rPr lang="en-US" sz="1200" dirty="0"/>
+                      <a:endParaRPr lang="en-US" sz="1000" dirty="0"/>
+                    </a:p>
+                  </a:txBody>
+                  <a:tcPr/>
+                </a:tc>
+                <a:tc>
+                  <a:txBody>
+                    <a:bodyPr/>
+                    <a:lstStyle/>
+                    <a:p>
+                      <a:r>
+                        <a:rPr lang="en-US" sz="1000" dirty="0"/>
                         <a:t>concentration BOOLEAN NOT NULL</a:t>
                       </a:r>
                     </a:p>
@@ -3842,7 +3842,7 @@
                     <a:bodyPr/>
                     <a:lstStyle/>
                     <a:p>
-                      <a:endParaRPr lang="en-US" sz="1200" dirty="0"/>
+                      <a:endParaRPr lang="en-US" sz="1000" dirty="0"/>
                     </a:p>
                   </a:txBody>
                   <a:tcPr/>
@@ -3870,7 +3870,7 @@
                         <a:defRPr/>
                       </a:pPr>
                       <a:r>
-                        <a:rPr lang="en-US" sz="1200" dirty="0"/>
+                        <a:rPr lang="en-US" sz="1000" dirty="0"/>
                         <a:t>ritual BOOLEAN NOT NULL</a:t>
                       </a:r>
                     </a:p>
@@ -3883,13 +3883,164 @@
                   </a:ext>
                 </a:extLst>
               </a:tr>
-              <a:tr h="194776">
-                <a:tc>
-                  <a:txBody>
-                    <a:bodyPr/>
-                    <a:lstStyle/>
-                    <a:p>
-                      <a:endParaRPr lang="en-US" sz="1200" dirty="0"/>
+            </a:tbl>
+          </a:graphicData>
+        </a:graphic>
+      </p:graphicFrame>
+      <p:graphicFrame>
+        <p:nvGraphicFramePr>
+          <p:cNvPr id="5" name="Table 4">
+            <a:extLst>
+              <a:ext uri="{FF2B5EF4-FFF2-40B4-BE49-F238E27FC236}">
+                <a16:creationId xmlns:a16="http://schemas.microsoft.com/office/drawing/2014/main" id="{E1B8D2D8-1660-1C59-A8B9-D9F026D676FF}"/>
+              </a:ext>
+            </a:extLst>
+          </p:cNvPr>
+          <p:cNvGraphicFramePr>
+            <a:graphicFrameLocks noGrp="1"/>
+          </p:cNvGraphicFramePr>
+          <p:nvPr>
+            <p:extLst>
+              <p:ext uri="{D42A27DB-BD31-4B8C-83A1-F6EECF244321}">
+                <p14:modId xmlns:p14="http://schemas.microsoft.com/office/powerpoint/2010/main" val="2139949432"/>
+              </p:ext>
+            </p:extLst>
+          </p:nvPr>
+        </p:nvGraphicFramePr>
+        <p:xfrm>
+          <a:off x="8764623" y="2079190"/>
+          <a:ext cx="2735187" cy="1005840"/>
+        </p:xfrm>
+        <a:graphic>
+          <a:graphicData uri="http://schemas.openxmlformats.org/drawingml/2006/table">
+            <a:tbl>
+              <a:tblPr firstRow="1" bandRow="1">
+                <a:tableStyleId>{5C22544A-7EE6-4342-B048-85BDC9FD1C3A}</a:tableStyleId>
+              </a:tblPr>
+              <a:tblGrid>
+                <a:gridCol w="374758">
+                  <a:extLst>
+                    <a:ext uri="{9D8B030D-6E8A-4147-A177-3AD203B41FA5}">
+                      <a16:colId xmlns:a16="http://schemas.microsoft.com/office/drawing/2014/main" val="1454048853"/>
+                    </a:ext>
+                  </a:extLst>
+                </a:gridCol>
+                <a:gridCol w="2360429">
+                  <a:extLst>
+                    <a:ext uri="{9D8B030D-6E8A-4147-A177-3AD203B41FA5}">
+                      <a16:colId xmlns:a16="http://schemas.microsoft.com/office/drawing/2014/main" val="3290258725"/>
+                    </a:ext>
+                  </a:extLst>
+                </a:gridCol>
+              </a:tblGrid>
+              <a:tr h="170745">
+                <a:tc gridSpan="2">
+                  <a:txBody>
+                    <a:bodyPr/>
+                    <a:lstStyle/>
+                    <a:p>
+                      <a:r>
+                        <a:rPr lang="en-US" sz="1200" dirty="0"/>
+                        <a:t>Fusion</a:t>
+                      </a:r>
+                    </a:p>
+                  </a:txBody>
+                  <a:tcPr/>
+                </a:tc>
+                <a:tc hMerge="1">
+                  <a:txBody>
+                    <a:bodyPr/>
+                    <a:lstStyle/>
+                    <a:p>
+                      <a:endParaRPr lang="en-US"/>
+                    </a:p>
+                  </a:txBody>
+                  <a:tcPr/>
+                </a:tc>
+                <a:extLst>
+                  <a:ext uri="{0D108BD9-81ED-4DB2-BD59-A6C34878D82A}">
+                    <a16:rowId xmlns:a16="http://schemas.microsoft.com/office/drawing/2014/main" val="2639570993"/>
+                  </a:ext>
+                </a:extLst>
+              </a:tr>
+              <a:tr h="170745">
+                <a:tc>
+                  <a:txBody>
+                    <a:bodyPr/>
+                    <a:lstStyle/>
+                    <a:p>
+                      <a:r>
+                        <a:rPr lang="en-US" sz="1000" dirty="0"/>
+                        <a:t>PK</a:t>
+                      </a:r>
+                    </a:p>
+                  </a:txBody>
+                  <a:tcPr/>
+                </a:tc>
+                <a:tc>
+                  <a:txBody>
+                    <a:bodyPr/>
+                    <a:lstStyle/>
+                    <a:p>
+                      <a:r>
+                        <a:rPr lang="en-US" sz="1000" dirty="0" err="1"/>
+                        <a:t>fusion_id</a:t>
+                      </a:r>
+                      <a:r>
+                        <a:rPr lang="en-US" sz="1000" dirty="0"/>
+                        <a:t> INT NOT NULL</a:t>
+                      </a:r>
+                    </a:p>
+                  </a:txBody>
+                  <a:tcPr/>
+                </a:tc>
+                <a:extLst>
+                  <a:ext uri="{0D108BD9-81ED-4DB2-BD59-A6C34878D82A}">
+                    <a16:rowId xmlns:a16="http://schemas.microsoft.com/office/drawing/2014/main" val="342633362"/>
+                  </a:ext>
+                </a:extLst>
+              </a:tr>
+              <a:tr h="170745">
+                <a:tc>
+                  <a:txBody>
+                    <a:bodyPr/>
+                    <a:lstStyle/>
+                    <a:p>
+                      <a:endParaRPr lang="en-US" sz="1000" dirty="0"/>
+                    </a:p>
+                  </a:txBody>
+                  <a:tcPr/>
+                </a:tc>
+                <a:tc>
+                  <a:txBody>
+                    <a:bodyPr/>
+                    <a:lstStyle/>
+                    <a:p>
+                      <a:r>
+                        <a:rPr lang="en-US" sz="1000" dirty="0" err="1"/>
+                        <a:t>fusion_name</a:t>
+                      </a:r>
+                      <a:r>
+                        <a:rPr lang="en-US" sz="1000" dirty="0"/>
+                        <a:t> TEXT UNIQUE NOT NULL</a:t>
+                      </a:r>
+                    </a:p>
+                  </a:txBody>
+                  <a:tcPr/>
+                </a:tc>
+                <a:extLst>
+                  <a:ext uri="{0D108BD9-81ED-4DB2-BD59-A6C34878D82A}">
+                    <a16:rowId xmlns:a16="http://schemas.microsoft.com/office/drawing/2014/main" val="1136051870"/>
+                  </a:ext>
+                </a:extLst>
+              </a:tr>
+              <a:tr h="170745">
+                <a:tc>
+                  <a:txBody>
+                    <a:bodyPr/>
+                    <a:lstStyle/>
+                    <a:p>
+                      <a:endParaRPr lang="en-US" sz="1000" dirty="0"/>
                     </a:p>
                   </a:txBody>
                   <a:tcPr/>
@@ -3917,210 +4068,8 @@
                         <a:defRPr/>
                       </a:pPr>
                       <a:r>
-                        <a:rPr lang="en-US" sz="1200" dirty="0" err="1"/>
-                        <a:t>spell_type</a:t>
-                      </a:r>
-                      <a:r>
-                        <a:rPr lang="en-US" sz="1200" dirty="0"/>
-                        <a:t> TEXT NOT NULL</a:t>
-                      </a:r>
-                    </a:p>
-                  </a:txBody>
-                  <a:tcPr/>
-                </a:tc>
-                <a:extLst>
-                  <a:ext uri="{0D108BD9-81ED-4DB2-BD59-A6C34878D82A}">
-                    <a16:rowId xmlns:a16="http://schemas.microsoft.com/office/drawing/2014/main" val="185294450"/>
-                  </a:ext>
-                </a:extLst>
-              </a:tr>
-            </a:tbl>
-          </a:graphicData>
-        </a:graphic>
-      </p:graphicFrame>
-      <p:graphicFrame>
-        <p:nvGraphicFramePr>
-          <p:cNvPr id="5" name="Table 4">
-            <a:extLst>
-              <a:ext uri="{FF2B5EF4-FFF2-40B4-BE49-F238E27FC236}">
-                <a16:creationId xmlns:a16="http://schemas.microsoft.com/office/drawing/2014/main" id="{E1B8D2D8-1660-1C59-A8B9-D9F026D676FF}"/>
-              </a:ext>
-            </a:extLst>
-          </p:cNvPr>
-          <p:cNvGraphicFramePr>
-            <a:graphicFrameLocks noGrp="1"/>
-          </p:cNvGraphicFramePr>
-          <p:nvPr>
-            <p:extLst>
-              <p:ext uri="{D42A27DB-BD31-4B8C-83A1-F6EECF244321}">
-                <p14:modId xmlns:p14="http://schemas.microsoft.com/office/powerpoint/2010/main" val="4151321825"/>
-              </p:ext>
-            </p:extLst>
-          </p:nvPr>
-        </p:nvGraphicFramePr>
-        <p:xfrm>
-          <a:off x="5282280" y="1918307"/>
-          <a:ext cx="3260587" cy="1127760"/>
-        </p:xfrm>
-        <a:graphic>
-          <a:graphicData uri="http://schemas.openxmlformats.org/drawingml/2006/table">
-            <a:tbl>
-              <a:tblPr firstRow="1" bandRow="1">
-                <a:tableStyleId>{5C22544A-7EE6-4342-B048-85BDC9FD1C3A}</a:tableStyleId>
-              </a:tblPr>
-              <a:tblGrid>
-                <a:gridCol w="446745">
-                  <a:extLst>
-                    <a:ext uri="{9D8B030D-6E8A-4147-A177-3AD203B41FA5}">
-                      <a16:colId xmlns:a16="http://schemas.microsoft.com/office/drawing/2014/main" val="1454048853"/>
-                    </a:ext>
-                  </a:extLst>
-                </a:gridCol>
-                <a:gridCol w="2813842">
-                  <a:extLst>
-                    <a:ext uri="{9D8B030D-6E8A-4147-A177-3AD203B41FA5}">
-                      <a16:colId xmlns:a16="http://schemas.microsoft.com/office/drawing/2014/main" val="3290258725"/>
-                    </a:ext>
-                  </a:extLst>
-                </a:gridCol>
-              </a:tblGrid>
-              <a:tr h="170745">
-                <a:tc gridSpan="2">
-                  <a:txBody>
-                    <a:bodyPr/>
-                    <a:lstStyle/>
-                    <a:p>
-                      <a:r>
-                        <a:rPr lang="en-US" sz="1400" dirty="0"/>
-                        <a:t>Fusion</a:t>
-                      </a:r>
-                    </a:p>
-                  </a:txBody>
-                  <a:tcPr/>
-                </a:tc>
-                <a:tc hMerge="1">
-                  <a:txBody>
-                    <a:bodyPr/>
-                    <a:lstStyle/>
-                    <a:p>
-                      <a:endParaRPr lang="en-US"/>
-                    </a:p>
-                  </a:txBody>
-                  <a:tcPr/>
-                </a:tc>
-                <a:extLst>
-                  <a:ext uri="{0D108BD9-81ED-4DB2-BD59-A6C34878D82A}">
-                    <a16:rowId xmlns:a16="http://schemas.microsoft.com/office/drawing/2014/main" val="2639570993"/>
-                  </a:ext>
-                </a:extLst>
-              </a:tr>
-              <a:tr h="170745">
-                <a:tc>
-                  <a:txBody>
-                    <a:bodyPr/>
-                    <a:lstStyle/>
-                    <a:p>
-                      <a:r>
-                        <a:rPr lang="en-US" sz="1200" dirty="0"/>
-                        <a:t>PK</a:t>
-                      </a:r>
-                    </a:p>
-                  </a:txBody>
-                  <a:tcPr/>
-                </a:tc>
-                <a:tc>
-                  <a:txBody>
-                    <a:bodyPr/>
-                    <a:lstStyle/>
-                    <a:p>
-                      <a:r>
-                        <a:rPr lang="en-US" sz="1200" dirty="0" err="1"/>
-                        <a:t>fusion_id</a:t>
-                      </a:r>
-                      <a:r>
-                        <a:rPr lang="en-US" sz="1200" dirty="0"/>
-                        <a:t> INT NOT NULL</a:t>
-                      </a:r>
-                    </a:p>
-                  </a:txBody>
-                  <a:tcPr/>
-                </a:tc>
-                <a:extLst>
-                  <a:ext uri="{0D108BD9-81ED-4DB2-BD59-A6C34878D82A}">
-                    <a16:rowId xmlns:a16="http://schemas.microsoft.com/office/drawing/2014/main" val="342633362"/>
-                  </a:ext>
-                </a:extLst>
-              </a:tr>
-              <a:tr h="170745">
-                <a:tc>
-                  <a:txBody>
-                    <a:bodyPr/>
-                    <a:lstStyle/>
-                    <a:p>
-                      <a:endParaRPr lang="en-US" sz="1200" dirty="0"/>
-                    </a:p>
-                  </a:txBody>
-                  <a:tcPr/>
-                </a:tc>
-                <a:tc>
-                  <a:txBody>
-                    <a:bodyPr/>
-                    <a:lstStyle/>
-                    <a:p>
-                      <a:r>
-                        <a:rPr lang="en-US" sz="1200" dirty="0" err="1"/>
-                        <a:t>fusion_name</a:t>
-                      </a:r>
-                      <a:r>
-                        <a:rPr lang="en-US" sz="1200" dirty="0"/>
-                        <a:t> TEXT UNIQUE NOT NULL</a:t>
-                      </a:r>
-                    </a:p>
-                  </a:txBody>
-                  <a:tcPr/>
-                </a:tc>
-                <a:extLst>
-                  <a:ext uri="{0D108BD9-81ED-4DB2-BD59-A6C34878D82A}">
-                    <a16:rowId xmlns:a16="http://schemas.microsoft.com/office/drawing/2014/main" val="1136051870"/>
-                  </a:ext>
-                </a:extLst>
-              </a:tr>
-              <a:tr h="170745">
-                <a:tc>
-                  <a:txBody>
-                    <a:bodyPr/>
-                    <a:lstStyle/>
-                    <a:p>
-                      <a:endParaRPr lang="en-US" sz="1200" dirty="0"/>
-                    </a:p>
-                  </a:txBody>
-                  <a:tcPr/>
-                </a:tc>
-                <a:tc>
-                  <a:txBody>
-                    <a:bodyPr/>
-                    <a:lstStyle/>
-                    <a:p>
-                      <a:pPr marL="0" marR="0" lvl="0" indent="0" algn="l" defTabSz="914400" rtl="0" eaLnBrk="1" fontAlgn="auto" latinLnBrk="0" hangingPunct="1">
-                        <a:lnSpc>
-                          <a:spcPct val="100000"/>
-                        </a:lnSpc>
-                        <a:spcBef>
-                          <a:spcPts val="0"/>
-                        </a:spcBef>
-                        <a:spcAft>
-                          <a:spcPts val="0"/>
-                        </a:spcAft>
-                        <a:buClrTx/>
-                        <a:buSzTx/>
-                        <a:buFontTx/>
-                        <a:buNone/>
-                        <a:tabLst/>
-                        <a:defRPr/>
-                      </a:pPr>
-                      <a:r>
-                        <a:rPr lang="en-US" sz="1200" dirty="0"/>
-                        <a:t>effect TEXT UNIQUE NOT NULL</a:t>
+                        <a:rPr lang="en-US" sz="1000" dirty="0"/>
+                        <a:t>description TEXT UNIQUE NOT NULL</a:t>
                       </a:r>
                     </a:p>
                   </a:txBody>
@@ -4151,14 +4100,14 @@
           <p:nvPr>
             <p:extLst>
               <p:ext uri="{D42A27DB-BD31-4B8C-83A1-F6EECF244321}">
-                <p14:modId xmlns:p14="http://schemas.microsoft.com/office/powerpoint/2010/main" val="4199792083"/>
+                <p14:modId xmlns:p14="http://schemas.microsoft.com/office/powerpoint/2010/main" val="4155115816"/>
               </p:ext>
             </p:extLst>
           </p:nvPr>
         </p:nvGraphicFramePr>
         <p:xfrm>
-          <a:off x="1263650" y="5699017"/>
-          <a:ext cx="2944284" cy="853440"/>
+          <a:off x="8770974" y="4735939"/>
+          <a:ext cx="2550545" cy="807100"/>
         </p:xfrm>
         <a:graphic>
           <a:graphicData uri="http://schemas.openxmlformats.org/drawingml/2006/table">
@@ -4167,14 +4116,14 @@
                 <a:tableStyleId>{5C22544A-7EE6-4342-B048-85BDC9FD1C3A}</a:tableStyleId>
               </a:tblPr>
               <a:tblGrid>
-                <a:gridCol w="430153">
+                <a:gridCol w="372629">
                   <a:extLst>
                     <a:ext uri="{9D8B030D-6E8A-4147-A177-3AD203B41FA5}">
                       <a16:colId xmlns:a16="http://schemas.microsoft.com/office/drawing/2014/main" val="1454048853"/>
                     </a:ext>
                   </a:extLst>
                 </a:gridCol>
-                <a:gridCol w="2514131">
+                <a:gridCol w="2177916">
                   <a:extLst>
                     <a:ext uri="{9D8B030D-6E8A-4147-A177-3AD203B41FA5}">
                       <a16:colId xmlns:a16="http://schemas.microsoft.com/office/drawing/2014/main" val="3290258725"/>
@@ -4189,7 +4138,7 @@
                     <a:lstStyle/>
                     <a:p>
                       <a:r>
-                        <a:rPr lang="en-US" sz="1400" dirty="0"/>
+                        <a:rPr lang="en-US" sz="1200" dirty="0"/>
                         <a:t>Class</a:t>
                       </a:r>
                     </a:p>
@@ -4219,7 +4168,7 @@
                     <a:lstStyle/>
                     <a:p>
                       <a:r>
-                        <a:rPr lang="en-US" sz="1200" dirty="0"/>
+                        <a:rPr lang="en-US" sz="1000" dirty="0"/>
                         <a:t>PK</a:t>
                       </a:r>
                     </a:p>
@@ -4232,11 +4181,11 @@
                     <a:lstStyle/>
                     <a:p>
                       <a:r>
-                        <a:rPr lang="en-US" sz="1200" dirty="0" err="1"/>
+                        <a:rPr lang="en-US" sz="1000" dirty="0" err="1"/>
                         <a:t>character_class_id</a:t>
                       </a:r>
                       <a:r>
-                        <a:rPr lang="en-US" sz="1200" dirty="0"/>
+                        <a:rPr lang="en-US" sz="1000" dirty="0"/>
                         <a:t> INT NOT NULL</a:t>
                       </a:r>
                     </a:p>
@@ -4255,22 +4204,22 @@
                     <a:bodyPr/>
                     <a:lstStyle/>
                     <a:p>
-                      <a:endParaRPr lang="en-US" sz="1200" dirty="0"/>
-                    </a:p>
-                  </a:txBody>
-                  <a:tcPr/>
-                </a:tc>
-                <a:tc>
-                  <a:txBody>
-                    <a:bodyPr/>
-                    <a:lstStyle/>
-                    <a:p>
-                      <a:r>
-                        <a:rPr lang="en-US" sz="1200" dirty="0" err="1"/>
+                      <a:endParaRPr lang="en-US" sz="1000" dirty="0"/>
+                    </a:p>
+                  </a:txBody>
+                  <a:tcPr/>
+                </a:tc>
+                <a:tc>
+                  <a:txBody>
+                    <a:bodyPr/>
+                    <a:lstStyle/>
+                    <a:p>
+                      <a:r>
+                        <a:rPr lang="en-US" sz="1000" dirty="0" err="1"/>
                         <a:t>character_class</a:t>
                       </a:r>
                       <a:r>
-                        <a:rPr lang="en-US" sz="1200" dirty="0"/>
+                        <a:rPr lang="en-US" sz="1000" dirty="0"/>
                         <a:t> TEXT NOT NULL</a:t>
                       </a:r>
                     </a:p>
@@ -4302,14 +4251,14 @@
           <p:nvPr>
             <p:extLst>
               <p:ext uri="{D42A27DB-BD31-4B8C-83A1-F6EECF244321}">
-                <p14:modId xmlns:p14="http://schemas.microsoft.com/office/powerpoint/2010/main" val="1087539848"/>
+                <p14:modId xmlns:p14="http://schemas.microsoft.com/office/powerpoint/2010/main" val="3377473753"/>
               </p:ext>
             </p:extLst>
           </p:nvPr>
         </p:nvGraphicFramePr>
         <p:xfrm>
-          <a:off x="1282699" y="4538026"/>
-          <a:ext cx="3292860" cy="874182"/>
+          <a:off x="5088889" y="3727859"/>
+          <a:ext cx="2600803" cy="854073"/>
         </p:xfrm>
         <a:graphic>
           <a:graphicData uri="http://schemas.openxmlformats.org/drawingml/2006/table">
@@ -4318,14 +4267,14 @@
                 <a:tableStyleId>{5C22544A-7EE6-4342-B048-85BDC9FD1C3A}</a:tableStyleId>
               </a:tblPr>
               <a:tblGrid>
-                <a:gridCol w="690034">
+                <a:gridCol w="545010">
                   <a:extLst>
                     <a:ext uri="{9D8B030D-6E8A-4147-A177-3AD203B41FA5}">
                       <a16:colId xmlns:a16="http://schemas.microsoft.com/office/drawing/2014/main" val="1454048853"/>
                     </a:ext>
                   </a:extLst>
                 </a:gridCol>
-                <a:gridCol w="2602826">
+                <a:gridCol w="2055793">
                   <a:extLst>
                     <a:ext uri="{9D8B030D-6E8A-4147-A177-3AD203B41FA5}">
                       <a16:colId xmlns:a16="http://schemas.microsoft.com/office/drawing/2014/main" val="3290258725"/>
@@ -4340,10 +4289,10 @@
                     <a:lstStyle/>
                     <a:p>
                       <a:r>
-                        <a:rPr lang="en-US" sz="1400" dirty="0" err="1"/>
+                        <a:rPr lang="en-US" sz="1200" dirty="0" err="1"/>
                         <a:t>Spell_Class</a:t>
                       </a:r>
-                      <a:endParaRPr lang="en-US" sz="1400" dirty="0"/>
+                      <a:endParaRPr lang="en-US" sz="1200" dirty="0"/>
                     </a:p>
                   </a:txBody>
                   <a:tcPr/>
@@ -4371,7 +4320,7 @@
                     <a:lstStyle/>
                     <a:p>
                       <a:r>
-                        <a:rPr lang="en-US" sz="1200" dirty="0"/>
+                        <a:rPr lang="en-US" sz="1000" dirty="0"/>
                         <a:t>PK, FK</a:t>
                       </a:r>
                     </a:p>
@@ -4384,11 +4333,11 @@
                     <a:lstStyle/>
                     <a:p>
                       <a:r>
-                        <a:rPr lang="en-US" sz="1200" dirty="0" err="1"/>
+                        <a:rPr lang="en-US" sz="1000" dirty="0" err="1"/>
                         <a:t>spell_id</a:t>
                       </a:r>
                       <a:r>
-                        <a:rPr lang="en-US" sz="1200" dirty="0"/>
+                        <a:rPr lang="en-US" sz="1000" dirty="0"/>
                         <a:t> INT NOT NULL</a:t>
                       </a:r>
                     </a:p>
@@ -4408,7 +4357,7 @@
                     <a:lstStyle/>
                     <a:p>
                       <a:r>
-                        <a:rPr lang="en-US" sz="1200" dirty="0"/>
+                        <a:rPr lang="en-US" sz="1000" dirty="0"/>
                         <a:t>PK, FK</a:t>
                       </a:r>
                     </a:p>
@@ -4421,11 +4370,11 @@
                     <a:lstStyle/>
                     <a:p>
                       <a:r>
-                        <a:rPr lang="en-US" sz="1200" dirty="0" err="1"/>
+                        <a:rPr lang="en-US" sz="1000" dirty="0" err="1"/>
                         <a:t>character_class_id</a:t>
                       </a:r>
                       <a:r>
-                        <a:rPr lang="en-US" sz="1200" dirty="0"/>
+                        <a:rPr lang="en-US" sz="1000" dirty="0"/>
                         <a:t> INT NOT NULL</a:t>
                       </a:r>
                     </a:p>
@@ -4457,14 +4406,14 @@
           <p:nvPr>
             <p:extLst>
               <p:ext uri="{D42A27DB-BD31-4B8C-83A1-F6EECF244321}">
-                <p14:modId xmlns:p14="http://schemas.microsoft.com/office/powerpoint/2010/main" val="2404519787"/>
+                <p14:modId xmlns:p14="http://schemas.microsoft.com/office/powerpoint/2010/main" val="225264183"/>
               </p:ext>
             </p:extLst>
           </p:nvPr>
         </p:nvGraphicFramePr>
         <p:xfrm>
-          <a:off x="5275933" y="372536"/>
-          <a:ext cx="2235200" cy="874182"/>
+          <a:off x="8764623" y="221984"/>
+          <a:ext cx="2239727" cy="854073"/>
         </p:xfrm>
         <a:graphic>
           <a:graphicData uri="http://schemas.openxmlformats.org/drawingml/2006/table">
@@ -4473,14 +4422,14 @@
                 <a:tableStyleId>{5C22544A-7EE6-4342-B048-85BDC9FD1C3A}</a:tableStyleId>
               </a:tblPr>
               <a:tblGrid>
-                <a:gridCol w="427023">
+                <a:gridCol w="617505">
                   <a:extLst>
                     <a:ext uri="{9D8B030D-6E8A-4147-A177-3AD203B41FA5}">
                       <a16:colId xmlns:a16="http://schemas.microsoft.com/office/drawing/2014/main" val="1454048853"/>
                     </a:ext>
                   </a:extLst>
                 </a:gridCol>
-                <a:gridCol w="1808177">
+                <a:gridCol w="1622222">
                   <a:extLst>
                     <a:ext uri="{9D8B030D-6E8A-4147-A177-3AD203B41FA5}">
                       <a16:colId xmlns:a16="http://schemas.microsoft.com/office/drawing/2014/main" val="3290258725"/>
@@ -4495,10 +4444,10 @@
                     <a:lstStyle/>
                     <a:p>
                       <a:r>
-                        <a:rPr lang="en-US" sz="1400" dirty="0" err="1"/>
+                        <a:rPr lang="en-US" sz="1200" dirty="0" err="1"/>
                         <a:t>Spell_Fusion</a:t>
                       </a:r>
-                      <a:endParaRPr lang="en-US" sz="1400" dirty="0"/>
+                      <a:endParaRPr lang="en-US" sz="1200" dirty="0"/>
                     </a:p>
                   </a:txBody>
                   <a:tcPr/>
@@ -4526,24 +4475,24 @@
                     <a:lstStyle/>
                     <a:p>
                       <a:r>
-                        <a:rPr lang="en-US" sz="1200" dirty="0"/>
-                        <a:t>FK</a:t>
-                      </a:r>
-                    </a:p>
-                  </a:txBody>
-                  <a:tcPr/>
-                </a:tc>
-                <a:tc>
-                  <a:txBody>
-                    <a:bodyPr/>
-                    <a:lstStyle/>
-                    <a:p>
-                      <a:r>
-                        <a:rPr lang="en-US" sz="1200" dirty="0" err="1"/>
+                        <a:rPr lang="en-US" sz="1000" dirty="0"/>
+                        <a:t>PK, FK</a:t>
+                      </a:r>
+                    </a:p>
+                  </a:txBody>
+                  <a:tcPr/>
+                </a:tc>
+                <a:tc>
+                  <a:txBody>
+                    <a:bodyPr/>
+                    <a:lstStyle/>
+                    <a:p>
+                      <a:r>
+                        <a:rPr lang="en-US" sz="1000" dirty="0" err="1"/>
                         <a:t>spell_id</a:t>
                       </a:r>
                       <a:r>
-                        <a:rPr lang="en-US" sz="1200" dirty="0"/>
+                        <a:rPr lang="en-US" sz="1000" dirty="0"/>
                         <a:t> INT NOT NULL</a:t>
                       </a:r>
                     </a:p>
@@ -4563,24 +4512,24 @@
                     <a:lstStyle/>
                     <a:p>
                       <a:r>
-                        <a:rPr lang="en-US" sz="1200" dirty="0"/>
-                        <a:t>FK</a:t>
-                      </a:r>
-                    </a:p>
-                  </a:txBody>
-                  <a:tcPr/>
-                </a:tc>
-                <a:tc>
-                  <a:txBody>
-                    <a:bodyPr/>
-                    <a:lstStyle/>
-                    <a:p>
-                      <a:r>
-                        <a:rPr lang="en-US" sz="1200" dirty="0" err="1"/>
+                        <a:rPr lang="en-US" sz="1000" dirty="0"/>
+                        <a:t>PK, FK</a:t>
+                      </a:r>
+                    </a:p>
+                  </a:txBody>
+                  <a:tcPr/>
+                </a:tc>
+                <a:tc>
+                  <a:txBody>
+                    <a:bodyPr/>
+                    <a:lstStyle/>
+                    <a:p>
+                      <a:r>
+                        <a:rPr lang="en-US" sz="1000" dirty="0" err="1"/>
                         <a:t>fusion_id</a:t>
                       </a:r>
                       <a:r>
-                        <a:rPr lang="en-US" sz="1200" dirty="0"/>
+                        <a:rPr lang="en-US" sz="1000" dirty="0"/>
                         <a:t> INT NOT NULL</a:t>
                       </a:r>
                     </a:p>
@@ -4599,52 +4548,6 @@
       </p:graphicFrame>
       <p:cxnSp>
         <p:nvCxnSpPr>
-          <p:cNvPr id="62" name="Connector: Elbow 61">
-            <a:extLst>
-              <a:ext uri="{FF2B5EF4-FFF2-40B4-BE49-F238E27FC236}">
-                <a16:creationId xmlns:a16="http://schemas.microsoft.com/office/drawing/2014/main" id="{EC012FB6-50FD-7FF3-3FE8-E56E540E845E}"/>
-              </a:ext>
-            </a:extLst>
-          </p:cNvPr>
-          <p:cNvCxnSpPr>
-            <a:cxnSpLocks/>
-            <a:endCxn id="6" idx="1"/>
-          </p:cNvCxnSpPr>
-          <p:nvPr/>
-        </p:nvCxnSpPr>
-        <p:spPr>
-          <a:xfrm rot="5400000">
-            <a:off x="840407" y="5702477"/>
-            <a:ext cx="846504" cy="17"/>
-          </a:xfrm>
-          <a:prstGeom prst="bentConnector4">
-            <a:avLst>
-              <a:gd name="adj1" fmla="val 24795"/>
-              <a:gd name="adj2" fmla="val 1344805882"/>
-            </a:avLst>
-          </a:prstGeom>
-          <a:ln>
-            <a:headEnd type="triangle"/>
-            <a:tailEnd type="triangle"/>
-          </a:ln>
-        </p:spPr>
-        <p:style>
-          <a:lnRef idx="2">
-            <a:schemeClr val="accent1"/>
-          </a:lnRef>
-          <a:fillRef idx="0">
-            <a:schemeClr val="accent1"/>
-          </a:fillRef>
-          <a:effectRef idx="1">
-            <a:schemeClr val="accent1"/>
-          </a:effectRef>
-          <a:fontRef idx="minor">
-            <a:schemeClr val="tx1"/>
-          </a:fontRef>
-        </p:style>
-      </p:cxnSp>
-      <p:cxnSp>
-        <p:nvCxnSpPr>
           <p:cNvPr id="76" name="Connector: Elbow 75">
             <a:extLst>
               <a:ext uri="{FF2B5EF4-FFF2-40B4-BE49-F238E27FC236}">
@@ -4660,13 +4563,13 @@
         </p:nvCxnSpPr>
         <p:spPr>
           <a:xfrm rot="5400000">
-            <a:off x="4589121" y="1782639"/>
-            <a:ext cx="1392708" cy="6389"/>
+            <a:off x="7913171" y="1730657"/>
+            <a:ext cx="1702905" cy="12700"/>
           </a:xfrm>
           <a:prstGeom prst="bentConnector4">
             <a:avLst>
-              <a:gd name="adj1" fmla="val 29756"/>
-              <a:gd name="adj2" fmla="val 3678025"/>
+              <a:gd name="adj1" fmla="val -192"/>
+              <a:gd name="adj2" fmla="val 3100000"/>
             </a:avLst>
           </a:prstGeom>
           <a:ln>
@@ -4700,14 +4603,13 @@
           </p:cNvPr>
           <p:cNvCxnSpPr>
             <a:cxnSpLocks/>
-            <a:endCxn id="26" idx="1"/>
           </p:cNvCxnSpPr>
           <p:nvPr/>
         </p:nvCxnSpPr>
         <p:spPr>
           <a:xfrm>
-            <a:off x="4675568" y="809627"/>
-            <a:ext cx="600365" cy="0"/>
+            <a:off x="7396401" y="629970"/>
+            <a:ext cx="1368222" cy="0"/>
           </a:xfrm>
           <a:prstGeom prst="straightConnector1">
             <a:avLst/>
@@ -4732,12 +4634,1068 @@
           </a:fontRef>
         </p:style>
       </p:cxnSp>
+      <p:graphicFrame>
+        <p:nvGraphicFramePr>
+          <p:cNvPr id="2" name="Table 1">
+            <a:extLst>
+              <a:ext uri="{FF2B5EF4-FFF2-40B4-BE49-F238E27FC236}">
+                <a16:creationId xmlns:a16="http://schemas.microsoft.com/office/drawing/2014/main" id="{D261D575-ED3E-1867-18AE-2A8083F8F5B5}"/>
+              </a:ext>
+            </a:extLst>
+          </p:cNvPr>
+          <p:cNvGraphicFramePr>
+            <a:graphicFrameLocks noGrp="1"/>
+          </p:cNvGraphicFramePr>
+          <p:nvPr>
+            <p:extLst>
+              <p:ext uri="{D42A27DB-BD31-4B8C-83A1-F6EECF244321}">
+                <p14:modId xmlns:p14="http://schemas.microsoft.com/office/powerpoint/2010/main" val="382037255"/>
+              </p:ext>
+            </p:extLst>
+          </p:nvPr>
+        </p:nvGraphicFramePr>
+        <p:xfrm>
+          <a:off x="618105" y="4026969"/>
+          <a:ext cx="2550545" cy="2225040"/>
+        </p:xfrm>
+        <a:graphic>
+          <a:graphicData uri="http://schemas.openxmlformats.org/drawingml/2006/table">
+            <a:tbl>
+              <a:tblPr firstRow="1" bandRow="1">
+                <a:tableStyleId>{5C22544A-7EE6-4342-B048-85BDC9FD1C3A}</a:tableStyleId>
+              </a:tblPr>
+              <a:tblGrid>
+                <a:gridCol w="349460">
+                  <a:extLst>
+                    <a:ext uri="{9D8B030D-6E8A-4147-A177-3AD203B41FA5}">
+                      <a16:colId xmlns:a16="http://schemas.microsoft.com/office/drawing/2014/main" val="1454048853"/>
+                    </a:ext>
+                  </a:extLst>
+                </a:gridCol>
+                <a:gridCol w="2201085">
+                  <a:extLst>
+                    <a:ext uri="{9D8B030D-6E8A-4147-A177-3AD203B41FA5}">
+                      <a16:colId xmlns:a16="http://schemas.microsoft.com/office/drawing/2014/main" val="3290258725"/>
+                    </a:ext>
+                  </a:extLst>
+                </a:gridCol>
+              </a:tblGrid>
+              <a:tr h="170745">
+                <a:tc gridSpan="2">
+                  <a:txBody>
+                    <a:bodyPr/>
+                    <a:lstStyle/>
+                    <a:p>
+                      <a:r>
+                        <a:rPr lang="en-US" sz="1200" dirty="0"/>
+                        <a:t>XYZ</a:t>
+                      </a:r>
+                    </a:p>
+                  </a:txBody>
+                  <a:tcPr/>
+                </a:tc>
+                <a:tc hMerge="1">
+                  <a:txBody>
+                    <a:bodyPr/>
+                    <a:lstStyle/>
+                    <a:p>
+                      <a:endParaRPr lang="en-US"/>
+                    </a:p>
+                  </a:txBody>
+                  <a:tcPr/>
+                </a:tc>
+                <a:extLst>
+                  <a:ext uri="{0D108BD9-81ED-4DB2-BD59-A6C34878D82A}">
+                    <a16:rowId xmlns:a16="http://schemas.microsoft.com/office/drawing/2014/main" val="2639570993"/>
+                  </a:ext>
+                </a:extLst>
+              </a:tr>
+              <a:tr h="170745">
+                <a:tc>
+                  <a:txBody>
+                    <a:bodyPr/>
+                    <a:lstStyle/>
+                    <a:p>
+                      <a:r>
+                        <a:rPr lang="en-US" sz="1000" dirty="0"/>
+                        <a:t>PK</a:t>
+                      </a:r>
+                    </a:p>
+                  </a:txBody>
+                  <a:tcPr/>
+                </a:tc>
+                <a:tc>
+                  <a:txBody>
+                    <a:bodyPr/>
+                    <a:lstStyle/>
+                    <a:p>
+                      <a:r>
+                        <a:rPr lang="en-US" sz="1000" dirty="0" err="1"/>
+                        <a:t>xyz_id</a:t>
+                      </a:r>
+                      <a:r>
+                        <a:rPr lang="en-US" sz="1000" dirty="0"/>
+                        <a:t> INT NOT NULL</a:t>
+                      </a:r>
+                    </a:p>
+                  </a:txBody>
+                  <a:tcPr/>
+                </a:tc>
+                <a:extLst>
+                  <a:ext uri="{0D108BD9-81ED-4DB2-BD59-A6C34878D82A}">
+                    <a16:rowId xmlns:a16="http://schemas.microsoft.com/office/drawing/2014/main" val="342633362"/>
+                  </a:ext>
+                </a:extLst>
+              </a:tr>
+              <a:tr h="170745">
+                <a:tc>
+                  <a:txBody>
+                    <a:bodyPr/>
+                    <a:lstStyle/>
+                    <a:p>
+                      <a:endParaRPr lang="en-US" sz="1000" dirty="0"/>
+                    </a:p>
+                  </a:txBody>
+                  <a:tcPr/>
+                </a:tc>
+                <a:tc>
+                  <a:txBody>
+                    <a:bodyPr/>
+                    <a:lstStyle/>
+                    <a:p>
+                      <a:r>
+                        <a:rPr lang="en-US" sz="1000" dirty="0" err="1"/>
+                        <a:t>xyz_name</a:t>
+                      </a:r>
+                      <a:r>
+                        <a:rPr lang="en-US" sz="1000" dirty="0"/>
+                        <a:t> TEXT UNIQUE NOT NULL</a:t>
+                      </a:r>
+                    </a:p>
+                  </a:txBody>
+                  <a:tcPr/>
+                </a:tc>
+                <a:extLst>
+                  <a:ext uri="{0D108BD9-81ED-4DB2-BD59-A6C34878D82A}">
+                    <a16:rowId xmlns:a16="http://schemas.microsoft.com/office/drawing/2014/main" val="1136051870"/>
+                  </a:ext>
+                </a:extLst>
+              </a:tr>
+              <a:tr h="170745">
+                <a:tc>
+                  <a:txBody>
+                    <a:bodyPr/>
+                    <a:lstStyle/>
+                    <a:p>
+                      <a:endParaRPr lang="en-US" sz="1000" dirty="0"/>
+                    </a:p>
+                  </a:txBody>
+                  <a:tcPr/>
+                </a:tc>
+                <a:tc>
+                  <a:txBody>
+                    <a:bodyPr/>
+                    <a:lstStyle/>
+                    <a:p>
+                      <a:r>
+                        <a:rPr lang="en-US" sz="1000" dirty="0"/>
+                        <a:t>rank INT NOT NULL</a:t>
+                      </a:r>
+                    </a:p>
+                  </a:txBody>
+                  <a:tcPr/>
+                </a:tc>
+                <a:extLst>
+                  <a:ext uri="{0D108BD9-81ED-4DB2-BD59-A6C34878D82A}">
+                    <a16:rowId xmlns:a16="http://schemas.microsoft.com/office/drawing/2014/main" val="2478033676"/>
+                  </a:ext>
+                </a:extLst>
+              </a:tr>
+              <a:tr h="170745">
+                <a:tc>
+                  <a:txBody>
+                    <a:bodyPr/>
+                    <a:lstStyle/>
+                    <a:p>
+                      <a:endParaRPr lang="en-US" sz="1000" dirty="0"/>
+                    </a:p>
+                  </a:txBody>
+                  <a:tcPr/>
+                </a:tc>
+                <a:tc>
+                  <a:txBody>
+                    <a:bodyPr/>
+                    <a:lstStyle/>
+                    <a:p>
+                      <a:r>
+                        <a:rPr lang="en-US" sz="1000" dirty="0" err="1"/>
+                        <a:t>casting_time</a:t>
+                      </a:r>
+                      <a:r>
+                        <a:rPr lang="en-US" sz="1000" dirty="0"/>
+                        <a:t> TEXT NOT NULL</a:t>
+                      </a:r>
+                    </a:p>
+                  </a:txBody>
+                  <a:tcPr/>
+                </a:tc>
+                <a:extLst>
+                  <a:ext uri="{0D108BD9-81ED-4DB2-BD59-A6C34878D82A}">
+                    <a16:rowId xmlns:a16="http://schemas.microsoft.com/office/drawing/2014/main" val="1811857099"/>
+                  </a:ext>
+                </a:extLst>
+              </a:tr>
+              <a:tr h="170745">
+                <a:tc>
+                  <a:txBody>
+                    <a:bodyPr/>
+                    <a:lstStyle/>
+                    <a:p>
+                      <a:endParaRPr lang="en-US" sz="1000" dirty="0"/>
+                    </a:p>
+                  </a:txBody>
+                  <a:tcPr/>
+                </a:tc>
+                <a:tc>
+                  <a:txBody>
+                    <a:bodyPr/>
+                    <a:lstStyle/>
+                    <a:p>
+                      <a:r>
+                        <a:rPr lang="en-US" sz="1000" dirty="0"/>
+                        <a:t>duration TEXT NOT NULL</a:t>
+                      </a:r>
+                    </a:p>
+                  </a:txBody>
+                  <a:tcPr/>
+                </a:tc>
+                <a:extLst>
+                  <a:ext uri="{0D108BD9-81ED-4DB2-BD59-A6C34878D82A}">
+                    <a16:rowId xmlns:a16="http://schemas.microsoft.com/office/drawing/2014/main" val="1876273744"/>
+                  </a:ext>
+                </a:extLst>
+              </a:tr>
+              <a:tr h="170745">
+                <a:tc>
+                  <a:txBody>
+                    <a:bodyPr/>
+                    <a:lstStyle/>
+                    <a:p>
+                      <a:endParaRPr lang="en-US" sz="1000" dirty="0"/>
+                    </a:p>
+                  </a:txBody>
+                  <a:tcPr/>
+                </a:tc>
+                <a:tc>
+                  <a:txBody>
+                    <a:bodyPr/>
+                    <a:lstStyle/>
+                    <a:p>
+                      <a:r>
+                        <a:rPr lang="en-US" sz="1000" dirty="0"/>
+                        <a:t>range TEXT NOT NULL</a:t>
+                      </a:r>
+                    </a:p>
+                  </a:txBody>
+                  <a:tcPr/>
+                </a:tc>
+                <a:extLst>
+                  <a:ext uri="{0D108BD9-81ED-4DB2-BD59-A6C34878D82A}">
+                    <a16:rowId xmlns:a16="http://schemas.microsoft.com/office/drawing/2014/main" val="2854993199"/>
+                  </a:ext>
+                </a:extLst>
+              </a:tr>
+              <a:tr h="170745">
+                <a:tc>
+                  <a:txBody>
+                    <a:bodyPr/>
+                    <a:lstStyle/>
+                    <a:p>
+                      <a:endParaRPr lang="en-US" sz="1000" dirty="0"/>
+                    </a:p>
+                  </a:txBody>
+                  <a:tcPr/>
+                </a:tc>
+                <a:tc>
+                  <a:txBody>
+                    <a:bodyPr/>
+                    <a:lstStyle/>
+                    <a:p>
+                      <a:r>
+                        <a:rPr lang="en-US" sz="1000" dirty="0"/>
+                        <a:t>components TEXT NOT NULL</a:t>
+                      </a:r>
+                    </a:p>
+                  </a:txBody>
+                  <a:tcPr/>
+                </a:tc>
+                <a:extLst>
+                  <a:ext uri="{0D108BD9-81ED-4DB2-BD59-A6C34878D82A}">
+                    <a16:rowId xmlns:a16="http://schemas.microsoft.com/office/drawing/2014/main" val="3456777749"/>
+                  </a:ext>
+                </a:extLst>
+              </a:tr>
+              <a:tr h="170745">
+                <a:tc>
+                  <a:txBody>
+                    <a:bodyPr/>
+                    <a:lstStyle/>
+                    <a:p>
+                      <a:endParaRPr lang="en-US" sz="1000" dirty="0"/>
+                    </a:p>
+                  </a:txBody>
+                  <a:tcPr/>
+                </a:tc>
+                <a:tc>
+                  <a:txBody>
+                    <a:bodyPr/>
+                    <a:lstStyle/>
+                    <a:p>
+                      <a:pPr marL="0" marR="0" lvl="0" indent="0" algn="l" defTabSz="914400" rtl="0" eaLnBrk="1" fontAlgn="auto" latinLnBrk="0" hangingPunct="1">
+                        <a:lnSpc>
+                          <a:spcPct val="100000"/>
+                        </a:lnSpc>
+                        <a:spcBef>
+                          <a:spcPts val="0"/>
+                        </a:spcBef>
+                        <a:spcAft>
+                          <a:spcPts val="0"/>
+                        </a:spcAft>
+                        <a:buClrTx/>
+                        <a:buSzTx/>
+                        <a:buFontTx/>
+                        <a:buNone/>
+                        <a:tabLst/>
+                        <a:defRPr/>
+                      </a:pPr>
+                      <a:r>
+                        <a:rPr lang="en-US" sz="1000" dirty="0"/>
+                        <a:t>description TEXT UNIQUE NOT NULL</a:t>
+                      </a:r>
+                    </a:p>
+                  </a:txBody>
+                  <a:tcPr/>
+                </a:tc>
+                <a:extLst>
+                  <a:ext uri="{0D108BD9-81ED-4DB2-BD59-A6C34878D82A}">
+                    <a16:rowId xmlns:a16="http://schemas.microsoft.com/office/drawing/2014/main" val="3917895233"/>
+                  </a:ext>
+                </a:extLst>
+              </a:tr>
+            </a:tbl>
+          </a:graphicData>
+        </a:graphic>
+      </p:graphicFrame>
+      <p:graphicFrame>
+        <p:nvGraphicFramePr>
+          <p:cNvPr id="8" name="Table 7">
+            <a:extLst>
+              <a:ext uri="{FF2B5EF4-FFF2-40B4-BE49-F238E27FC236}">
+                <a16:creationId xmlns:a16="http://schemas.microsoft.com/office/drawing/2014/main" id="{7B517D3E-826E-A3B6-8BA3-A3C044B93EDD}"/>
+              </a:ext>
+            </a:extLst>
+          </p:cNvPr>
+          <p:cNvGraphicFramePr>
+            <a:graphicFrameLocks noGrp="1"/>
+          </p:cNvGraphicFramePr>
+          <p:nvPr>
+            <p:extLst>
+              <p:ext uri="{D42A27DB-BD31-4B8C-83A1-F6EECF244321}">
+                <p14:modId xmlns:p14="http://schemas.microsoft.com/office/powerpoint/2010/main" val="3794112114"/>
+              </p:ext>
+            </p:extLst>
+          </p:nvPr>
+        </p:nvGraphicFramePr>
+        <p:xfrm>
+          <a:off x="618105" y="879205"/>
+          <a:ext cx="2550545" cy="2225040"/>
+        </p:xfrm>
+        <a:graphic>
+          <a:graphicData uri="http://schemas.openxmlformats.org/drawingml/2006/table">
+            <a:tbl>
+              <a:tblPr firstRow="1" bandRow="1">
+                <a:tableStyleId>{5C22544A-7EE6-4342-B048-85BDC9FD1C3A}</a:tableStyleId>
+              </a:tblPr>
+              <a:tblGrid>
+                <a:gridCol w="331117">
+                  <a:extLst>
+                    <a:ext uri="{9D8B030D-6E8A-4147-A177-3AD203B41FA5}">
+                      <a16:colId xmlns:a16="http://schemas.microsoft.com/office/drawing/2014/main" val="1454048853"/>
+                    </a:ext>
+                  </a:extLst>
+                </a:gridCol>
+                <a:gridCol w="2219428">
+                  <a:extLst>
+                    <a:ext uri="{9D8B030D-6E8A-4147-A177-3AD203B41FA5}">
+                      <a16:colId xmlns:a16="http://schemas.microsoft.com/office/drawing/2014/main" val="3290258725"/>
+                    </a:ext>
+                  </a:extLst>
+                </a:gridCol>
+              </a:tblGrid>
+              <a:tr h="170745">
+                <a:tc gridSpan="2">
+                  <a:txBody>
+                    <a:bodyPr/>
+                    <a:lstStyle/>
+                    <a:p>
+                      <a:r>
+                        <a:rPr lang="en-US" sz="1200" dirty="0"/>
+                        <a:t>Link</a:t>
+                      </a:r>
+                    </a:p>
+                  </a:txBody>
+                  <a:tcPr/>
+                </a:tc>
+                <a:tc hMerge="1">
+                  <a:txBody>
+                    <a:bodyPr/>
+                    <a:lstStyle/>
+                    <a:p>
+                      <a:endParaRPr lang="en-US"/>
+                    </a:p>
+                  </a:txBody>
+                  <a:tcPr/>
+                </a:tc>
+                <a:extLst>
+                  <a:ext uri="{0D108BD9-81ED-4DB2-BD59-A6C34878D82A}">
+                    <a16:rowId xmlns:a16="http://schemas.microsoft.com/office/drawing/2014/main" val="2639570993"/>
+                  </a:ext>
+                </a:extLst>
+              </a:tr>
+              <a:tr h="170745">
+                <a:tc>
+                  <a:txBody>
+                    <a:bodyPr/>
+                    <a:lstStyle/>
+                    <a:p>
+                      <a:r>
+                        <a:rPr lang="en-US" sz="1000" dirty="0"/>
+                        <a:t>PK</a:t>
+                      </a:r>
+                    </a:p>
+                  </a:txBody>
+                  <a:tcPr/>
+                </a:tc>
+                <a:tc>
+                  <a:txBody>
+                    <a:bodyPr/>
+                    <a:lstStyle/>
+                    <a:p>
+                      <a:r>
+                        <a:rPr lang="en-US" sz="1000" dirty="0" err="1"/>
+                        <a:t>link_id</a:t>
+                      </a:r>
+                      <a:r>
+                        <a:rPr lang="en-US" sz="1000" dirty="0"/>
+                        <a:t> INT NOT NULL</a:t>
+                      </a:r>
+                    </a:p>
+                  </a:txBody>
+                  <a:tcPr/>
+                </a:tc>
+                <a:extLst>
+                  <a:ext uri="{0D108BD9-81ED-4DB2-BD59-A6C34878D82A}">
+                    <a16:rowId xmlns:a16="http://schemas.microsoft.com/office/drawing/2014/main" val="342633362"/>
+                  </a:ext>
+                </a:extLst>
+              </a:tr>
+              <a:tr h="170745">
+                <a:tc>
+                  <a:txBody>
+                    <a:bodyPr/>
+                    <a:lstStyle/>
+                    <a:p>
+                      <a:endParaRPr lang="en-US" sz="1000" dirty="0"/>
+                    </a:p>
+                  </a:txBody>
+                  <a:tcPr/>
+                </a:tc>
+                <a:tc>
+                  <a:txBody>
+                    <a:bodyPr/>
+                    <a:lstStyle/>
+                    <a:p>
+                      <a:r>
+                        <a:rPr lang="en-US" sz="1000" dirty="0" err="1"/>
+                        <a:t>link_name</a:t>
+                      </a:r>
+                      <a:r>
+                        <a:rPr lang="en-US" sz="1000" dirty="0"/>
+                        <a:t> TEXT UNIQUE NOT NULL</a:t>
+                      </a:r>
+                    </a:p>
+                  </a:txBody>
+                  <a:tcPr/>
+                </a:tc>
+                <a:extLst>
+                  <a:ext uri="{0D108BD9-81ED-4DB2-BD59-A6C34878D82A}">
+                    <a16:rowId xmlns:a16="http://schemas.microsoft.com/office/drawing/2014/main" val="1136051870"/>
+                  </a:ext>
+                </a:extLst>
+              </a:tr>
+              <a:tr h="170745">
+                <a:tc>
+                  <a:txBody>
+                    <a:bodyPr/>
+                    <a:lstStyle/>
+                    <a:p>
+                      <a:endParaRPr lang="en-US" sz="1000" dirty="0"/>
+                    </a:p>
+                  </a:txBody>
+                  <a:tcPr/>
+                </a:tc>
+                <a:tc>
+                  <a:txBody>
+                    <a:bodyPr/>
+                    <a:lstStyle/>
+                    <a:p>
+                      <a:r>
+                        <a:rPr lang="en-US" sz="1000" dirty="0"/>
+                        <a:t>rating INT NOT NULL</a:t>
+                      </a:r>
+                    </a:p>
+                  </a:txBody>
+                  <a:tcPr/>
+                </a:tc>
+                <a:extLst>
+                  <a:ext uri="{0D108BD9-81ED-4DB2-BD59-A6C34878D82A}">
+                    <a16:rowId xmlns:a16="http://schemas.microsoft.com/office/drawing/2014/main" val="2478033676"/>
+                  </a:ext>
+                </a:extLst>
+              </a:tr>
+              <a:tr h="170745">
+                <a:tc>
+                  <a:txBody>
+                    <a:bodyPr/>
+                    <a:lstStyle/>
+                    <a:p>
+                      <a:endParaRPr lang="en-US" sz="1000" dirty="0"/>
+                    </a:p>
+                  </a:txBody>
+                  <a:tcPr/>
+                </a:tc>
+                <a:tc>
+                  <a:txBody>
+                    <a:bodyPr/>
+                    <a:lstStyle/>
+                    <a:p>
+                      <a:r>
+                        <a:rPr lang="en-US" sz="1000" dirty="0" err="1"/>
+                        <a:t>casting_time</a:t>
+                      </a:r>
+                      <a:r>
+                        <a:rPr lang="en-US" sz="1000" dirty="0"/>
+                        <a:t> TEXT NOT NULL</a:t>
+                      </a:r>
+                    </a:p>
+                  </a:txBody>
+                  <a:tcPr/>
+                </a:tc>
+                <a:extLst>
+                  <a:ext uri="{0D108BD9-81ED-4DB2-BD59-A6C34878D82A}">
+                    <a16:rowId xmlns:a16="http://schemas.microsoft.com/office/drawing/2014/main" val="1811857099"/>
+                  </a:ext>
+                </a:extLst>
+              </a:tr>
+              <a:tr h="170745">
+                <a:tc>
+                  <a:txBody>
+                    <a:bodyPr/>
+                    <a:lstStyle/>
+                    <a:p>
+                      <a:endParaRPr lang="en-US" sz="1000" dirty="0"/>
+                    </a:p>
+                  </a:txBody>
+                  <a:tcPr/>
+                </a:tc>
+                <a:tc>
+                  <a:txBody>
+                    <a:bodyPr/>
+                    <a:lstStyle/>
+                    <a:p>
+                      <a:r>
+                        <a:rPr lang="en-US" sz="1000" dirty="0"/>
+                        <a:t>duration TEXT NOT NULL</a:t>
+                      </a:r>
+                    </a:p>
+                  </a:txBody>
+                  <a:tcPr/>
+                </a:tc>
+                <a:extLst>
+                  <a:ext uri="{0D108BD9-81ED-4DB2-BD59-A6C34878D82A}">
+                    <a16:rowId xmlns:a16="http://schemas.microsoft.com/office/drawing/2014/main" val="1876273744"/>
+                  </a:ext>
+                </a:extLst>
+              </a:tr>
+              <a:tr h="170745">
+                <a:tc>
+                  <a:txBody>
+                    <a:bodyPr/>
+                    <a:lstStyle/>
+                    <a:p>
+                      <a:endParaRPr lang="en-US" sz="1000" dirty="0"/>
+                    </a:p>
+                  </a:txBody>
+                  <a:tcPr/>
+                </a:tc>
+                <a:tc>
+                  <a:txBody>
+                    <a:bodyPr/>
+                    <a:lstStyle/>
+                    <a:p>
+                      <a:r>
+                        <a:rPr lang="en-US" sz="1000" dirty="0"/>
+                        <a:t>range TEXT NOT NULL</a:t>
+                      </a:r>
+                    </a:p>
+                  </a:txBody>
+                  <a:tcPr/>
+                </a:tc>
+                <a:extLst>
+                  <a:ext uri="{0D108BD9-81ED-4DB2-BD59-A6C34878D82A}">
+                    <a16:rowId xmlns:a16="http://schemas.microsoft.com/office/drawing/2014/main" val="2854993199"/>
+                  </a:ext>
+                </a:extLst>
+              </a:tr>
+              <a:tr h="170745">
+                <a:tc>
+                  <a:txBody>
+                    <a:bodyPr/>
+                    <a:lstStyle/>
+                    <a:p>
+                      <a:endParaRPr lang="en-US" sz="1000" dirty="0"/>
+                    </a:p>
+                  </a:txBody>
+                  <a:tcPr/>
+                </a:tc>
+                <a:tc>
+                  <a:txBody>
+                    <a:bodyPr/>
+                    <a:lstStyle/>
+                    <a:p>
+                      <a:r>
+                        <a:rPr lang="en-US" sz="1000" dirty="0"/>
+                        <a:t>components TEXT NOT NULL</a:t>
+                      </a:r>
+                    </a:p>
+                  </a:txBody>
+                  <a:tcPr/>
+                </a:tc>
+                <a:extLst>
+                  <a:ext uri="{0D108BD9-81ED-4DB2-BD59-A6C34878D82A}">
+                    <a16:rowId xmlns:a16="http://schemas.microsoft.com/office/drawing/2014/main" val="3456777749"/>
+                  </a:ext>
+                </a:extLst>
+              </a:tr>
+              <a:tr h="170745">
+                <a:tc>
+                  <a:txBody>
+                    <a:bodyPr/>
+                    <a:lstStyle/>
+                    <a:p>
+                      <a:endParaRPr lang="en-US" sz="1000" dirty="0"/>
+                    </a:p>
+                  </a:txBody>
+                  <a:tcPr/>
+                </a:tc>
+                <a:tc>
+                  <a:txBody>
+                    <a:bodyPr/>
+                    <a:lstStyle/>
+                    <a:p>
+                      <a:pPr marL="0" marR="0" lvl="0" indent="0" algn="l" defTabSz="914400" rtl="0" eaLnBrk="1" fontAlgn="auto" latinLnBrk="0" hangingPunct="1">
+                        <a:lnSpc>
+                          <a:spcPct val="100000"/>
+                        </a:lnSpc>
+                        <a:spcBef>
+                          <a:spcPts val="0"/>
+                        </a:spcBef>
+                        <a:spcAft>
+                          <a:spcPts val="0"/>
+                        </a:spcAft>
+                        <a:buClrTx/>
+                        <a:buSzTx/>
+                        <a:buFontTx/>
+                        <a:buNone/>
+                        <a:tabLst/>
+                        <a:defRPr/>
+                      </a:pPr>
+                      <a:r>
+                        <a:rPr lang="en-US" sz="1000" dirty="0"/>
+                        <a:t>description TEXT UNIQUE NOT NULL</a:t>
+                      </a:r>
+                    </a:p>
+                  </a:txBody>
+                  <a:tcPr/>
+                </a:tc>
+                <a:extLst>
+                  <a:ext uri="{0D108BD9-81ED-4DB2-BD59-A6C34878D82A}">
+                    <a16:rowId xmlns:a16="http://schemas.microsoft.com/office/drawing/2014/main" val="3917895233"/>
+                  </a:ext>
+                </a:extLst>
+              </a:tr>
+            </a:tbl>
+          </a:graphicData>
+        </a:graphic>
+      </p:graphicFrame>
+      <p:graphicFrame>
+        <p:nvGraphicFramePr>
+          <p:cNvPr id="14" name="Table 13">
+            <a:extLst>
+              <a:ext uri="{FF2B5EF4-FFF2-40B4-BE49-F238E27FC236}">
+                <a16:creationId xmlns:a16="http://schemas.microsoft.com/office/drawing/2014/main" id="{F55040B0-4A56-441F-82F6-33C8D1B0D0C4}"/>
+              </a:ext>
+            </a:extLst>
+          </p:cNvPr>
+          <p:cNvGraphicFramePr>
+            <a:graphicFrameLocks noGrp="1"/>
+          </p:cNvGraphicFramePr>
+          <p:nvPr>
+            <p:extLst>
+              <p:ext uri="{D42A27DB-BD31-4B8C-83A1-F6EECF244321}">
+                <p14:modId xmlns:p14="http://schemas.microsoft.com/office/powerpoint/2010/main" val="854925668"/>
+              </p:ext>
+            </p:extLst>
+          </p:nvPr>
+        </p:nvGraphicFramePr>
+        <p:xfrm>
+          <a:off x="5088889" y="5890111"/>
+          <a:ext cx="2600803" cy="854073"/>
+        </p:xfrm>
+        <a:graphic>
+          <a:graphicData uri="http://schemas.openxmlformats.org/drawingml/2006/table">
+            <a:tbl>
+              <a:tblPr firstRow="1" bandRow="1">
+                <a:tableStyleId>{5C22544A-7EE6-4342-B048-85BDC9FD1C3A}</a:tableStyleId>
+              </a:tblPr>
+              <a:tblGrid>
+                <a:gridCol w="545010">
+                  <a:extLst>
+                    <a:ext uri="{9D8B030D-6E8A-4147-A177-3AD203B41FA5}">
+                      <a16:colId xmlns:a16="http://schemas.microsoft.com/office/drawing/2014/main" val="1454048853"/>
+                    </a:ext>
+                  </a:extLst>
+                </a:gridCol>
+                <a:gridCol w="2055793">
+                  <a:extLst>
+                    <a:ext uri="{9D8B030D-6E8A-4147-A177-3AD203B41FA5}">
+                      <a16:colId xmlns:a16="http://schemas.microsoft.com/office/drawing/2014/main" val="3290258725"/>
+                    </a:ext>
+                  </a:extLst>
+                </a:gridCol>
+              </a:tblGrid>
+              <a:tr h="284691">
+                <a:tc gridSpan="2">
+                  <a:txBody>
+                    <a:bodyPr/>
+                    <a:lstStyle/>
+                    <a:p>
+                      <a:r>
+                        <a:rPr lang="en-US" sz="1200" dirty="0" err="1"/>
+                        <a:t>XYZ_Class</a:t>
+                      </a:r>
+                      <a:endParaRPr lang="en-US" sz="1200" dirty="0"/>
+                    </a:p>
+                  </a:txBody>
+                  <a:tcPr/>
+                </a:tc>
+                <a:tc hMerge="1">
+                  <a:txBody>
+                    <a:bodyPr/>
+                    <a:lstStyle/>
+                    <a:p>
+                      <a:endParaRPr lang="en-US"/>
+                    </a:p>
+                  </a:txBody>
+                  <a:tcPr/>
+                </a:tc>
+                <a:extLst>
+                  <a:ext uri="{0D108BD9-81ED-4DB2-BD59-A6C34878D82A}">
+                    <a16:rowId xmlns:a16="http://schemas.microsoft.com/office/drawing/2014/main" val="2639570993"/>
+                  </a:ext>
+                </a:extLst>
+              </a:tr>
+              <a:tr h="284691">
+                <a:tc>
+                  <a:txBody>
+                    <a:bodyPr/>
+                    <a:lstStyle/>
+                    <a:p>
+                      <a:r>
+                        <a:rPr lang="en-US" sz="1000" dirty="0"/>
+                        <a:t>PK, FK</a:t>
+                      </a:r>
+                    </a:p>
+                  </a:txBody>
+                  <a:tcPr/>
+                </a:tc>
+                <a:tc>
+                  <a:txBody>
+                    <a:bodyPr/>
+                    <a:lstStyle/>
+                    <a:p>
+                      <a:r>
+                        <a:rPr lang="en-US" sz="1000" dirty="0" err="1"/>
+                        <a:t>xyz_id</a:t>
+                      </a:r>
+                      <a:r>
+                        <a:rPr lang="en-US" sz="1000" dirty="0"/>
+                        <a:t> INT NOT NULL</a:t>
+                      </a:r>
+                    </a:p>
+                  </a:txBody>
+                  <a:tcPr/>
+                </a:tc>
+                <a:extLst>
+                  <a:ext uri="{0D108BD9-81ED-4DB2-BD59-A6C34878D82A}">
+                    <a16:rowId xmlns:a16="http://schemas.microsoft.com/office/drawing/2014/main" val="342633362"/>
+                  </a:ext>
+                </a:extLst>
+              </a:tr>
+              <a:tr h="284691">
+                <a:tc>
+                  <a:txBody>
+                    <a:bodyPr/>
+                    <a:lstStyle/>
+                    <a:p>
+                      <a:r>
+                        <a:rPr lang="en-US" sz="1000" dirty="0"/>
+                        <a:t>PK, FK</a:t>
+                      </a:r>
+                    </a:p>
+                  </a:txBody>
+                  <a:tcPr/>
+                </a:tc>
+                <a:tc>
+                  <a:txBody>
+                    <a:bodyPr/>
+                    <a:lstStyle/>
+                    <a:p>
+                      <a:r>
+                        <a:rPr lang="en-US" sz="1000" dirty="0" err="1"/>
+                        <a:t>character_class_id</a:t>
+                      </a:r>
+                      <a:r>
+                        <a:rPr lang="en-US" sz="1000" dirty="0"/>
+                        <a:t> INT NOT NULL</a:t>
+                      </a:r>
+                    </a:p>
+                  </a:txBody>
+                  <a:tcPr/>
+                </a:tc>
+                <a:extLst>
+                  <a:ext uri="{0D108BD9-81ED-4DB2-BD59-A6C34878D82A}">
+                    <a16:rowId xmlns:a16="http://schemas.microsoft.com/office/drawing/2014/main" val="1136051870"/>
+                  </a:ext>
+                </a:extLst>
+              </a:tr>
+            </a:tbl>
+          </a:graphicData>
+        </a:graphic>
+      </p:graphicFrame>
+      <p:graphicFrame>
+        <p:nvGraphicFramePr>
+          <p:cNvPr id="15" name="Table 14">
+            <a:extLst>
+              <a:ext uri="{FF2B5EF4-FFF2-40B4-BE49-F238E27FC236}">
+                <a16:creationId xmlns:a16="http://schemas.microsoft.com/office/drawing/2014/main" id="{084AAA69-8DE7-AFC4-DA5E-FDF4FEF65A14}"/>
+              </a:ext>
+            </a:extLst>
+          </p:cNvPr>
+          <p:cNvGraphicFramePr>
+            <a:graphicFrameLocks noGrp="1"/>
+          </p:cNvGraphicFramePr>
+          <p:nvPr>
+            <p:extLst>
+              <p:ext uri="{D42A27DB-BD31-4B8C-83A1-F6EECF244321}">
+                <p14:modId xmlns:p14="http://schemas.microsoft.com/office/powerpoint/2010/main" val="996600924"/>
+              </p:ext>
+            </p:extLst>
+          </p:nvPr>
+        </p:nvGraphicFramePr>
+        <p:xfrm>
+          <a:off x="5088889" y="4815081"/>
+          <a:ext cx="2600803" cy="854073"/>
+        </p:xfrm>
+        <a:graphic>
+          <a:graphicData uri="http://schemas.openxmlformats.org/drawingml/2006/table">
+            <a:tbl>
+              <a:tblPr firstRow="1" bandRow="1">
+                <a:tableStyleId>{5C22544A-7EE6-4342-B048-85BDC9FD1C3A}</a:tableStyleId>
+              </a:tblPr>
+              <a:tblGrid>
+                <a:gridCol w="557551">
+                  <a:extLst>
+                    <a:ext uri="{9D8B030D-6E8A-4147-A177-3AD203B41FA5}">
+                      <a16:colId xmlns:a16="http://schemas.microsoft.com/office/drawing/2014/main" val="1454048853"/>
+                    </a:ext>
+                  </a:extLst>
+                </a:gridCol>
+                <a:gridCol w="2043252">
+                  <a:extLst>
+                    <a:ext uri="{9D8B030D-6E8A-4147-A177-3AD203B41FA5}">
+                      <a16:colId xmlns:a16="http://schemas.microsoft.com/office/drawing/2014/main" val="3290258725"/>
+                    </a:ext>
+                  </a:extLst>
+                </a:gridCol>
+              </a:tblGrid>
+              <a:tr h="284691">
+                <a:tc gridSpan="2">
+                  <a:txBody>
+                    <a:bodyPr/>
+                    <a:lstStyle/>
+                    <a:p>
+                      <a:r>
+                        <a:rPr lang="en-US" sz="1200" dirty="0" err="1"/>
+                        <a:t>Link_Class</a:t>
+                      </a:r>
+                      <a:endParaRPr lang="en-US" sz="1200" dirty="0"/>
+                    </a:p>
+                  </a:txBody>
+                  <a:tcPr/>
+                </a:tc>
+                <a:tc hMerge="1">
+                  <a:txBody>
+                    <a:bodyPr/>
+                    <a:lstStyle/>
+                    <a:p>
+                      <a:endParaRPr lang="en-US"/>
+                    </a:p>
+                  </a:txBody>
+                  <a:tcPr/>
+                </a:tc>
+                <a:extLst>
+                  <a:ext uri="{0D108BD9-81ED-4DB2-BD59-A6C34878D82A}">
+                    <a16:rowId xmlns:a16="http://schemas.microsoft.com/office/drawing/2014/main" val="2639570993"/>
+                  </a:ext>
+                </a:extLst>
+              </a:tr>
+              <a:tr h="284691">
+                <a:tc>
+                  <a:txBody>
+                    <a:bodyPr/>
+                    <a:lstStyle/>
+                    <a:p>
+                      <a:r>
+                        <a:rPr lang="en-US" sz="1000" dirty="0"/>
+                        <a:t>PK, FK</a:t>
+                      </a:r>
+                    </a:p>
+                  </a:txBody>
+                  <a:tcPr/>
+                </a:tc>
+                <a:tc>
+                  <a:txBody>
+                    <a:bodyPr/>
+                    <a:lstStyle/>
+                    <a:p>
+                      <a:r>
+                        <a:rPr lang="en-US" sz="1000" dirty="0" err="1"/>
+                        <a:t>link_id</a:t>
+                      </a:r>
+                      <a:r>
+                        <a:rPr lang="en-US" sz="1000" dirty="0"/>
+                        <a:t> INT NOT NULL</a:t>
+                      </a:r>
+                    </a:p>
+                  </a:txBody>
+                  <a:tcPr/>
+                </a:tc>
+                <a:extLst>
+                  <a:ext uri="{0D108BD9-81ED-4DB2-BD59-A6C34878D82A}">
+                    <a16:rowId xmlns:a16="http://schemas.microsoft.com/office/drawing/2014/main" val="342633362"/>
+                  </a:ext>
+                </a:extLst>
+              </a:tr>
+              <a:tr h="284691">
+                <a:tc>
+                  <a:txBody>
+                    <a:bodyPr/>
+                    <a:lstStyle/>
+                    <a:p>
+                      <a:r>
+                        <a:rPr lang="en-US" sz="1000" dirty="0"/>
+                        <a:t>PK, FK</a:t>
+                      </a:r>
+                    </a:p>
+                  </a:txBody>
+                  <a:tcPr/>
+                </a:tc>
+                <a:tc>
+                  <a:txBody>
+                    <a:bodyPr/>
+                    <a:lstStyle/>
+                    <a:p>
+                      <a:r>
+                        <a:rPr lang="en-US" sz="1000" dirty="0" err="1"/>
+                        <a:t>character_class_id</a:t>
+                      </a:r>
+                      <a:r>
+                        <a:rPr lang="en-US" sz="1000" dirty="0"/>
+                        <a:t> INT NOT NULL</a:t>
+                      </a:r>
+                    </a:p>
+                  </a:txBody>
+                  <a:tcPr/>
+                </a:tc>
+                <a:extLst>
+                  <a:ext uri="{0D108BD9-81ED-4DB2-BD59-A6C34878D82A}">
+                    <a16:rowId xmlns:a16="http://schemas.microsoft.com/office/drawing/2014/main" val="1136051870"/>
+                  </a:ext>
+                </a:extLst>
+              </a:tr>
+            </a:tbl>
+          </a:graphicData>
+        </a:graphic>
+      </p:graphicFrame>
       <p:cxnSp>
         <p:nvCxnSpPr>
-          <p:cNvPr id="34" name="Straight Arrow Connector 33">
-            <a:extLst>
-              <a:ext uri="{FF2B5EF4-FFF2-40B4-BE49-F238E27FC236}">
-                <a16:creationId xmlns:a16="http://schemas.microsoft.com/office/drawing/2014/main" id="{86691FDF-996A-0E7C-B93D-E536EF609FBC}"/>
+          <p:cNvPr id="54" name="Connector: Elbow 53">
+            <a:extLst>
+              <a:ext uri="{FF2B5EF4-FFF2-40B4-BE49-F238E27FC236}">
+                <a16:creationId xmlns:a16="http://schemas.microsoft.com/office/drawing/2014/main" id="{230B4D3F-16C4-9F1F-CE47-6D984AA94F03}"/>
+              </a:ext>
+            </a:extLst>
+          </p:cNvPr>
+          <p:cNvCxnSpPr>
+            <a:cxnSpLocks/>
+            <a:endCxn id="7" idx="1"/>
+          </p:cNvCxnSpPr>
+          <p:nvPr/>
+        </p:nvCxnSpPr>
+        <p:spPr>
+          <a:xfrm rot="16200000" flipH="1">
+            <a:off x="3077507" y="2143512"/>
+            <a:ext cx="3524925" cy="497839"/>
+          </a:xfrm>
+          <a:prstGeom prst="bentConnector2">
+            <a:avLst/>
+          </a:prstGeom>
+          <a:ln>
+            <a:tailEnd type="triangle"/>
+          </a:ln>
+        </p:spPr>
+        <p:style>
+          <a:lnRef idx="2">
+            <a:schemeClr val="accent1"/>
+          </a:lnRef>
+          <a:fillRef idx="0">
+            <a:schemeClr val="accent1"/>
+          </a:fillRef>
+          <a:effectRef idx="1">
+            <a:schemeClr val="accent1"/>
+          </a:effectRef>
+          <a:fontRef idx="minor">
+            <a:schemeClr val="tx1"/>
+          </a:fontRef>
+        </p:style>
+      </p:cxnSp>
+      <p:cxnSp>
+        <p:nvCxnSpPr>
+          <p:cNvPr id="57" name="Straight Arrow Connector 56">
+            <a:extLst>
+              <a:ext uri="{FF2B5EF4-FFF2-40B4-BE49-F238E27FC236}">
+                <a16:creationId xmlns:a16="http://schemas.microsoft.com/office/drawing/2014/main" id="{0875039A-994E-2ADC-A486-E8854584F9A5}"/>
               </a:ext>
             </a:extLst>
           </p:cNvPr>
@@ -4748,8 +5706,8 @@
         </p:nvCxnSpPr>
         <p:spPr>
           <a:xfrm>
-            <a:off x="1028700" y="809627"/>
-            <a:ext cx="228599" cy="0"/>
+            <a:off x="4591050" y="629970"/>
+            <a:ext cx="204548" cy="0"/>
           </a:xfrm>
           <a:prstGeom prst="straightConnector1">
             <a:avLst/>
@@ -4775,23 +5733,189 @@
       </p:cxnSp>
       <p:cxnSp>
         <p:nvCxnSpPr>
-          <p:cNvPr id="38" name="Straight Arrow Connector 37">
-            <a:extLst>
-              <a:ext uri="{FF2B5EF4-FFF2-40B4-BE49-F238E27FC236}">
-                <a16:creationId xmlns:a16="http://schemas.microsoft.com/office/drawing/2014/main" id="{2AFB7894-D5BF-4FF8-3CC0-725DAFB85184}"/>
+          <p:cNvPr id="65" name="Connector: Elbow 64">
+            <a:extLst>
+              <a:ext uri="{FF2B5EF4-FFF2-40B4-BE49-F238E27FC236}">
+                <a16:creationId xmlns:a16="http://schemas.microsoft.com/office/drawing/2014/main" id="{A0D59A97-8BD4-B88C-1C11-35AEC314015B}"/>
               </a:ext>
             </a:extLst>
           </p:cNvPr>
           <p:cNvCxnSpPr>
-            <a:cxnSpLocks/>
-            <a:endCxn id="7" idx="1"/>
+            <a:endCxn id="6" idx="1"/>
           </p:cNvCxnSpPr>
           <p:nvPr/>
         </p:nvCxnSpPr>
         <p:spPr>
           <a:xfrm>
-            <a:off x="1014413" y="4975117"/>
-            <a:ext cx="268286" cy="0"/>
+            <a:off x="7689692" y="4414838"/>
+            <a:ext cx="1081282" cy="724651"/>
+          </a:xfrm>
+          <a:prstGeom prst="bentConnector3">
+            <a:avLst/>
+          </a:prstGeom>
+          <a:ln>
+            <a:headEnd type="triangle"/>
+            <a:tailEnd type="triangle"/>
+          </a:ln>
+        </p:spPr>
+        <p:style>
+          <a:lnRef idx="2">
+            <a:schemeClr val="accent1"/>
+          </a:lnRef>
+          <a:fillRef idx="0">
+            <a:schemeClr val="accent1"/>
+          </a:fillRef>
+          <a:effectRef idx="1">
+            <a:schemeClr val="accent1"/>
+          </a:effectRef>
+          <a:fontRef idx="minor">
+            <a:schemeClr val="tx1"/>
+          </a:fontRef>
+        </p:style>
+      </p:cxnSp>
+      <p:cxnSp>
+        <p:nvCxnSpPr>
+          <p:cNvPr id="67" name="Connector: Elbow 66">
+            <a:extLst>
+              <a:ext uri="{FF2B5EF4-FFF2-40B4-BE49-F238E27FC236}">
+                <a16:creationId xmlns:a16="http://schemas.microsoft.com/office/drawing/2014/main" id="{0B43B6FE-FEB2-C08D-7BBE-A17C95767C26}"/>
+              </a:ext>
+            </a:extLst>
+          </p:cNvPr>
+          <p:cNvCxnSpPr>
+            <a:endCxn id="6" idx="1"/>
+          </p:cNvCxnSpPr>
+          <p:nvPr/>
+        </p:nvCxnSpPr>
+        <p:spPr>
+          <a:xfrm flipV="1">
+            <a:off x="7689692" y="5139489"/>
+            <a:ext cx="1081282" cy="356436"/>
+          </a:xfrm>
+          <a:prstGeom prst="bentConnector3">
+            <a:avLst/>
+          </a:prstGeom>
+          <a:ln>
+            <a:headEnd type="triangle"/>
+            <a:tailEnd type="triangle"/>
+          </a:ln>
+        </p:spPr>
+        <p:style>
+          <a:lnRef idx="2">
+            <a:schemeClr val="accent1"/>
+          </a:lnRef>
+          <a:fillRef idx="0">
+            <a:schemeClr val="accent1"/>
+          </a:fillRef>
+          <a:effectRef idx="1">
+            <a:schemeClr val="accent1"/>
+          </a:effectRef>
+          <a:fontRef idx="minor">
+            <a:schemeClr val="tx1"/>
+          </a:fontRef>
+        </p:style>
+      </p:cxnSp>
+      <p:cxnSp>
+        <p:nvCxnSpPr>
+          <p:cNvPr id="71" name="Connector: Elbow 70">
+            <a:extLst>
+              <a:ext uri="{FF2B5EF4-FFF2-40B4-BE49-F238E27FC236}">
+                <a16:creationId xmlns:a16="http://schemas.microsoft.com/office/drawing/2014/main" id="{5A499C3D-6BA5-9B8E-A9C0-89667D73133A}"/>
+              </a:ext>
+            </a:extLst>
+          </p:cNvPr>
+          <p:cNvCxnSpPr/>
+          <p:nvPr/>
+        </p:nvCxnSpPr>
+        <p:spPr>
+          <a:xfrm rot="5400000">
+            <a:off x="7381370" y="5713761"/>
+            <a:ext cx="1157287" cy="540641"/>
+          </a:xfrm>
+          <a:prstGeom prst="bentConnector3">
+            <a:avLst>
+              <a:gd name="adj1" fmla="val 100206"/>
+            </a:avLst>
+          </a:prstGeom>
+          <a:ln>
+            <a:tailEnd type="triangle"/>
+          </a:ln>
+        </p:spPr>
+        <p:style>
+          <a:lnRef idx="2">
+            <a:schemeClr val="accent1"/>
+          </a:lnRef>
+          <a:fillRef idx="0">
+            <a:schemeClr val="accent1"/>
+          </a:fillRef>
+          <a:effectRef idx="1">
+            <a:schemeClr val="accent1"/>
+          </a:effectRef>
+          <a:fontRef idx="minor">
+            <a:schemeClr val="tx1"/>
+          </a:fontRef>
+        </p:style>
+      </p:cxnSp>
+      <p:cxnSp>
+        <p:nvCxnSpPr>
+          <p:cNvPr id="89" name="Connector: Elbow 88">
+            <a:extLst>
+              <a:ext uri="{FF2B5EF4-FFF2-40B4-BE49-F238E27FC236}">
+                <a16:creationId xmlns:a16="http://schemas.microsoft.com/office/drawing/2014/main" id="{ED0AB0D3-3727-D90A-3796-9F0FF2007F01}"/>
+              </a:ext>
+            </a:extLst>
+          </p:cNvPr>
+          <p:cNvCxnSpPr>
+            <a:cxnSpLocks/>
+            <a:endCxn id="15" idx="1"/>
+          </p:cNvCxnSpPr>
+          <p:nvPr/>
+        </p:nvCxnSpPr>
+        <p:spPr>
+          <a:xfrm rot="16200000" flipH="1">
+            <a:off x="2551445" y="2704673"/>
+            <a:ext cx="3993606" cy="1081282"/>
+          </a:xfrm>
+          <a:prstGeom prst="bentConnector2">
+            <a:avLst/>
+          </a:prstGeom>
+          <a:ln>
+            <a:tailEnd type="triangle"/>
+          </a:ln>
+        </p:spPr>
+        <p:style>
+          <a:lnRef idx="2">
+            <a:schemeClr val="accent1"/>
+          </a:lnRef>
+          <a:fillRef idx="0">
+            <a:schemeClr val="accent1"/>
+          </a:fillRef>
+          <a:effectRef idx="1">
+            <a:schemeClr val="accent1"/>
+          </a:effectRef>
+          <a:fontRef idx="minor">
+            <a:schemeClr val="tx1"/>
+          </a:fontRef>
+        </p:style>
+      </p:cxnSp>
+      <p:cxnSp>
+        <p:nvCxnSpPr>
+          <p:cNvPr id="92" name="Straight Arrow Connector 91">
+            <a:extLst>
+              <a:ext uri="{FF2B5EF4-FFF2-40B4-BE49-F238E27FC236}">
+                <a16:creationId xmlns:a16="http://schemas.microsoft.com/office/drawing/2014/main" id="{82641478-42AC-AD2F-3694-1F431D3F08AE}"/>
+              </a:ext>
+            </a:extLst>
+          </p:cNvPr>
+          <p:cNvCxnSpPr>
+            <a:cxnSpLocks/>
+          </p:cNvCxnSpPr>
+          <p:nvPr/>
+        </p:nvCxnSpPr>
+        <p:spPr>
+          <a:xfrm flipH="1">
+            <a:off x="3168650" y="1248511"/>
+            <a:ext cx="838956" cy="0"/>
           </a:xfrm>
           <a:prstGeom prst="straightConnector1">
             <a:avLst/>
@@ -4817,10 +5941,51 @@
       </p:cxnSp>
       <p:cxnSp>
         <p:nvCxnSpPr>
-          <p:cNvPr id="40" name="Straight Connector 39">
-            <a:extLst>
-              <a:ext uri="{FF2B5EF4-FFF2-40B4-BE49-F238E27FC236}">
-                <a16:creationId xmlns:a16="http://schemas.microsoft.com/office/drawing/2014/main" id="{80A17EE7-6081-4BE0-F3C3-7FB4449B7AB0}"/>
+          <p:cNvPr id="96" name="Connector: Elbow 95">
+            <a:extLst>
+              <a:ext uri="{FF2B5EF4-FFF2-40B4-BE49-F238E27FC236}">
+                <a16:creationId xmlns:a16="http://schemas.microsoft.com/office/drawing/2014/main" id="{C1A9027A-F99A-FA43-F25B-21F1B8F93D85}"/>
+              </a:ext>
+            </a:extLst>
+          </p:cNvPr>
+          <p:cNvCxnSpPr>
+            <a:endCxn id="14" idx="1"/>
+          </p:cNvCxnSpPr>
+          <p:nvPr/>
+        </p:nvCxnSpPr>
+        <p:spPr>
+          <a:xfrm rot="16200000" flipH="1">
+            <a:off x="3422090" y="4650347"/>
+            <a:ext cx="1902309" cy="1431289"/>
+          </a:xfrm>
+          <a:prstGeom prst="bentConnector2">
+            <a:avLst/>
+          </a:prstGeom>
+          <a:ln>
+            <a:tailEnd type="triangle"/>
+          </a:ln>
+        </p:spPr>
+        <p:style>
+          <a:lnRef idx="2">
+            <a:schemeClr val="accent1"/>
+          </a:lnRef>
+          <a:fillRef idx="0">
+            <a:schemeClr val="accent1"/>
+          </a:fillRef>
+          <a:effectRef idx="1">
+            <a:schemeClr val="accent1"/>
+          </a:effectRef>
+          <a:fontRef idx="minor">
+            <a:schemeClr val="tx1"/>
+          </a:fontRef>
+        </p:style>
+      </p:cxnSp>
+      <p:cxnSp>
+        <p:nvCxnSpPr>
+          <p:cNvPr id="98" name="Straight Arrow Connector 97">
+            <a:extLst>
+              <a:ext uri="{FF2B5EF4-FFF2-40B4-BE49-F238E27FC236}">
+                <a16:creationId xmlns:a16="http://schemas.microsoft.com/office/drawing/2014/main" id="{C53E1A21-9671-D955-2B9A-E5347D289404}"/>
               </a:ext>
             </a:extLst>
           </p:cNvPr>
@@ -4831,12 +5996,15 @@
         </p:nvCxnSpPr>
         <p:spPr>
           <a:xfrm flipH="1">
-            <a:off x="1014413" y="809627"/>
-            <a:ext cx="14287" cy="4165490"/>
+            <a:off x="3168650" y="4414836"/>
+            <a:ext cx="497839" cy="2"/>
           </a:xfrm>
-          <a:prstGeom prst="line">
+          <a:prstGeom prst="straightConnector1">
             <a:avLst/>
           </a:prstGeom>
+          <a:ln>
+            <a:tailEnd type="triangle"/>
+          </a:ln>
         </p:spPr>
         <p:style>
           <a:lnRef idx="2">

</xml_diff>

<commit_message>
Update ERD and Fusion table creation.
Added duration, range, and concentration data members to Fusions.
</commit_message>
<xml_diff>
--- a/images/Spell database diagram.pptx
+++ b/images/Spell database diagram.pptx
@@ -259,7 +259,7 @@
           <a:p>
             <a:fld id="{2EA71DFD-377C-4EB5-BA3E-17FDF086A0CC}" type="datetimeFigureOut">
               <a:rPr lang="en-US" smtClean="0"/>
-              <a:t>9/12/2024</a:t>
+              <a:t>9/15/2024</a:t>
             </a:fld>
             <a:endParaRPr lang="en-US"/>
           </a:p>
@@ -457,7 +457,7 @@
           <a:p>
             <a:fld id="{2EA71DFD-377C-4EB5-BA3E-17FDF086A0CC}" type="datetimeFigureOut">
               <a:rPr lang="en-US" smtClean="0"/>
-              <a:t>9/12/2024</a:t>
+              <a:t>9/15/2024</a:t>
             </a:fld>
             <a:endParaRPr lang="en-US"/>
           </a:p>
@@ -665,7 +665,7 @@
           <a:p>
             <a:fld id="{2EA71DFD-377C-4EB5-BA3E-17FDF086A0CC}" type="datetimeFigureOut">
               <a:rPr lang="en-US" smtClean="0"/>
-              <a:t>9/12/2024</a:t>
+              <a:t>9/15/2024</a:t>
             </a:fld>
             <a:endParaRPr lang="en-US"/>
           </a:p>
@@ -863,7 +863,7 @@
           <a:p>
             <a:fld id="{2EA71DFD-377C-4EB5-BA3E-17FDF086A0CC}" type="datetimeFigureOut">
               <a:rPr lang="en-US" smtClean="0"/>
-              <a:t>9/12/2024</a:t>
+              <a:t>9/15/2024</a:t>
             </a:fld>
             <a:endParaRPr lang="en-US"/>
           </a:p>
@@ -1138,7 +1138,7 @@
           <a:p>
             <a:fld id="{2EA71DFD-377C-4EB5-BA3E-17FDF086A0CC}" type="datetimeFigureOut">
               <a:rPr lang="en-US" smtClean="0"/>
-              <a:t>9/12/2024</a:t>
+              <a:t>9/15/2024</a:t>
             </a:fld>
             <a:endParaRPr lang="en-US"/>
           </a:p>
@@ -1403,7 +1403,7 @@
           <a:p>
             <a:fld id="{2EA71DFD-377C-4EB5-BA3E-17FDF086A0CC}" type="datetimeFigureOut">
               <a:rPr lang="en-US" smtClean="0"/>
-              <a:t>9/12/2024</a:t>
+              <a:t>9/15/2024</a:t>
             </a:fld>
             <a:endParaRPr lang="en-US"/>
           </a:p>
@@ -1815,7 +1815,7 @@
           <a:p>
             <a:fld id="{2EA71DFD-377C-4EB5-BA3E-17FDF086A0CC}" type="datetimeFigureOut">
               <a:rPr lang="en-US" smtClean="0"/>
-              <a:t>9/12/2024</a:t>
+              <a:t>9/15/2024</a:t>
             </a:fld>
             <a:endParaRPr lang="en-US"/>
           </a:p>
@@ -1956,7 +1956,7 @@
           <a:p>
             <a:fld id="{2EA71DFD-377C-4EB5-BA3E-17FDF086A0CC}" type="datetimeFigureOut">
               <a:rPr lang="en-US" smtClean="0"/>
-              <a:t>9/12/2024</a:t>
+              <a:t>9/15/2024</a:t>
             </a:fld>
             <a:endParaRPr lang="en-US"/>
           </a:p>
@@ -2069,7 +2069,7 @@
           <a:p>
             <a:fld id="{2EA71DFD-377C-4EB5-BA3E-17FDF086A0CC}" type="datetimeFigureOut">
               <a:rPr lang="en-US" smtClean="0"/>
-              <a:t>9/12/2024</a:t>
+              <a:t>9/15/2024</a:t>
             </a:fld>
             <a:endParaRPr lang="en-US"/>
           </a:p>
@@ -2380,7 +2380,7 @@
           <a:p>
             <a:fld id="{2EA71DFD-377C-4EB5-BA3E-17FDF086A0CC}" type="datetimeFigureOut">
               <a:rPr lang="en-US" smtClean="0"/>
-              <a:t>9/12/2024</a:t>
+              <a:t>9/15/2024</a:t>
             </a:fld>
             <a:endParaRPr lang="en-US"/>
           </a:p>
@@ -2668,7 +2668,7 @@
           <a:p>
             <a:fld id="{2EA71DFD-377C-4EB5-BA3E-17FDF086A0CC}" type="datetimeFigureOut">
               <a:rPr lang="en-US" smtClean="0"/>
-              <a:t>9/12/2024</a:t>
+              <a:t>9/15/2024</a:t>
             </a:fld>
             <a:endParaRPr lang="en-US"/>
           </a:p>
@@ -2909,7 +2909,7 @@
           <a:p>
             <a:fld id="{2EA71DFD-377C-4EB5-BA3E-17FDF086A0CC}" type="datetimeFigureOut">
               <a:rPr lang="en-US" smtClean="0"/>
-              <a:t>9/12/2024</a:t>
+              <a:t>9/15/2024</a:t>
             </a:fld>
             <a:endParaRPr lang="en-US"/>
           </a:p>
@@ -3902,14 +3902,14 @@
           <p:nvPr>
             <p:extLst>
               <p:ext uri="{D42A27DB-BD31-4B8C-83A1-F6EECF244321}">
-                <p14:modId xmlns:p14="http://schemas.microsoft.com/office/powerpoint/2010/main" val="2139949432"/>
+                <p14:modId xmlns:p14="http://schemas.microsoft.com/office/powerpoint/2010/main" val="2456101456"/>
               </p:ext>
             </p:extLst>
           </p:nvPr>
         </p:nvGraphicFramePr>
         <p:xfrm>
           <a:off x="8764623" y="2079190"/>
-          <a:ext cx="2735187" cy="1005840"/>
+          <a:ext cx="2735187" cy="1737360"/>
         </p:xfrm>
         <a:graphic>
           <a:graphicData uri="http://schemas.openxmlformats.org/drawingml/2006/table">
@@ -4050,6 +4050,66 @@
                     <a:bodyPr/>
                     <a:lstStyle/>
                     <a:p>
+                      <a:r>
+                        <a:rPr lang="en-US" sz="1000" dirty="0"/>
+                        <a:t>duration TEXT NOT NULL</a:t>
+                      </a:r>
+                    </a:p>
+                  </a:txBody>
+                  <a:tcPr/>
+                </a:tc>
+                <a:extLst>
+                  <a:ext uri="{0D108BD9-81ED-4DB2-BD59-A6C34878D82A}">
+                    <a16:rowId xmlns:a16="http://schemas.microsoft.com/office/drawing/2014/main" val="1799915531"/>
+                  </a:ext>
+                </a:extLst>
+              </a:tr>
+              <a:tr h="170745">
+                <a:tc>
+                  <a:txBody>
+                    <a:bodyPr/>
+                    <a:lstStyle/>
+                    <a:p>
+                      <a:endParaRPr lang="en-US" sz="1000" dirty="0"/>
+                    </a:p>
+                  </a:txBody>
+                  <a:tcPr/>
+                </a:tc>
+                <a:tc>
+                  <a:txBody>
+                    <a:bodyPr/>
+                    <a:lstStyle/>
+                    <a:p>
+                      <a:r>
+                        <a:rPr lang="en-US" sz="1000" dirty="0"/>
+                        <a:t>range TEXT NOT NULL</a:t>
+                      </a:r>
+                    </a:p>
+                  </a:txBody>
+                  <a:tcPr/>
+                </a:tc>
+                <a:extLst>
+                  <a:ext uri="{0D108BD9-81ED-4DB2-BD59-A6C34878D82A}">
+                    <a16:rowId xmlns:a16="http://schemas.microsoft.com/office/drawing/2014/main" val="3273506061"/>
+                  </a:ext>
+                </a:extLst>
+              </a:tr>
+              <a:tr h="170745">
+                <a:tc>
+                  <a:txBody>
+                    <a:bodyPr/>
+                    <a:lstStyle/>
+                    <a:p>
+                      <a:endParaRPr lang="en-US" sz="1000" dirty="0"/>
+                    </a:p>
+                  </a:txBody>
+                  <a:tcPr/>
+                </a:tc>
+                <a:tc>
+                  <a:txBody>
+                    <a:bodyPr/>
+                    <a:lstStyle/>
+                    <a:p>
                       <a:pPr marL="0" marR="0" lvl="0" indent="0" algn="l" defTabSz="914400" rtl="0" eaLnBrk="1" fontAlgn="auto" latinLnBrk="0" hangingPunct="1">
                         <a:lnSpc>
                           <a:spcPct val="100000"/>
@@ -4078,6 +4138,53 @@
                 <a:extLst>
                   <a:ext uri="{0D108BD9-81ED-4DB2-BD59-A6C34878D82A}">
                     <a16:rowId xmlns:a16="http://schemas.microsoft.com/office/drawing/2014/main" val="3917895233"/>
+                  </a:ext>
+                </a:extLst>
+              </a:tr>
+              <a:tr h="170745">
+                <a:tc>
+                  <a:txBody>
+                    <a:bodyPr/>
+                    <a:lstStyle/>
+                    <a:p>
+                      <a:endParaRPr lang="en-US" sz="1000" dirty="0"/>
+                    </a:p>
+                  </a:txBody>
+                  <a:tcPr/>
+                </a:tc>
+                <a:tc>
+                  <a:txBody>
+                    <a:bodyPr/>
+                    <a:lstStyle/>
+                    <a:p>
+                      <a:pPr marL="0" marR="0" lvl="0" indent="0" algn="l" defTabSz="914400" rtl="0" eaLnBrk="1" fontAlgn="auto" latinLnBrk="0" hangingPunct="1">
+                        <a:lnSpc>
+                          <a:spcPct val="100000"/>
+                        </a:lnSpc>
+                        <a:spcBef>
+                          <a:spcPts val="0"/>
+                        </a:spcBef>
+                        <a:spcAft>
+                          <a:spcPts val="0"/>
+                        </a:spcAft>
+                        <a:buClrTx/>
+                        <a:buSzTx/>
+                        <a:buFontTx/>
+                        <a:buNone/>
+                        <a:tabLst/>
+                        <a:defRPr/>
+                      </a:pPr>
+                      <a:r>
+                        <a:rPr lang="en-US" sz="1000" dirty="0"/>
+                        <a:t>concentration BOOLEAN NOT NULL</a:t>
+                      </a:r>
+                    </a:p>
+                  </a:txBody>
+                  <a:tcPr/>
+                </a:tc>
+                <a:extLst>
+                  <a:ext uri="{0D108BD9-81ED-4DB2-BD59-A6C34878D82A}">
+                    <a16:rowId xmlns:a16="http://schemas.microsoft.com/office/drawing/2014/main" val="2700288759"/>
                   </a:ext>
                 </a:extLst>
               </a:tr>
@@ -4563,13 +4670,13 @@
         </p:nvCxnSpPr>
         <p:spPr>
           <a:xfrm rot="5400000">
-            <a:off x="7913171" y="1730657"/>
-            <a:ext cx="1702905" cy="12700"/>
+            <a:off x="7736642" y="1913536"/>
+            <a:ext cx="2062316" cy="6353"/>
           </a:xfrm>
           <a:prstGeom prst="bentConnector4">
             <a:avLst>
-              <a:gd name="adj1" fmla="val -192"/>
-              <a:gd name="adj2" fmla="val 3100000"/>
+              <a:gd name="adj1" fmla="val 28939"/>
+              <a:gd name="adj2" fmla="val 3698300"/>
             </a:avLst>
           </a:prstGeom>
           <a:ln>

</xml_diff>

<commit_message>
Add UNIQUE to Class(character_class) to diagram
Add UNIQUE constraint to Class(character_class) in the database. The constraint already existed in the database but was accidentally left out of the diagram.
</commit_message>
<xml_diff>
--- a/images/Spell database diagram.pptx
+++ b/images/Spell database diagram.pptx
@@ -259,7 +259,7 @@
           <a:p>
             <a:fld id="{2EA71DFD-377C-4EB5-BA3E-17FDF086A0CC}" type="datetimeFigureOut">
               <a:rPr lang="en-US" smtClean="0"/>
-              <a:t>9/15/2024</a:t>
+              <a:t>10/3/2024</a:t>
             </a:fld>
             <a:endParaRPr lang="en-US"/>
           </a:p>
@@ -457,7 +457,7 @@
           <a:p>
             <a:fld id="{2EA71DFD-377C-4EB5-BA3E-17FDF086A0CC}" type="datetimeFigureOut">
               <a:rPr lang="en-US" smtClean="0"/>
-              <a:t>9/15/2024</a:t>
+              <a:t>10/3/2024</a:t>
             </a:fld>
             <a:endParaRPr lang="en-US"/>
           </a:p>
@@ -665,7 +665,7 @@
           <a:p>
             <a:fld id="{2EA71DFD-377C-4EB5-BA3E-17FDF086A0CC}" type="datetimeFigureOut">
               <a:rPr lang="en-US" smtClean="0"/>
-              <a:t>9/15/2024</a:t>
+              <a:t>10/3/2024</a:t>
             </a:fld>
             <a:endParaRPr lang="en-US"/>
           </a:p>
@@ -863,7 +863,7 @@
           <a:p>
             <a:fld id="{2EA71DFD-377C-4EB5-BA3E-17FDF086A0CC}" type="datetimeFigureOut">
               <a:rPr lang="en-US" smtClean="0"/>
-              <a:t>9/15/2024</a:t>
+              <a:t>10/3/2024</a:t>
             </a:fld>
             <a:endParaRPr lang="en-US"/>
           </a:p>
@@ -1138,7 +1138,7 @@
           <a:p>
             <a:fld id="{2EA71DFD-377C-4EB5-BA3E-17FDF086A0CC}" type="datetimeFigureOut">
               <a:rPr lang="en-US" smtClean="0"/>
-              <a:t>9/15/2024</a:t>
+              <a:t>10/3/2024</a:t>
             </a:fld>
             <a:endParaRPr lang="en-US"/>
           </a:p>
@@ -1403,7 +1403,7 @@
           <a:p>
             <a:fld id="{2EA71DFD-377C-4EB5-BA3E-17FDF086A0CC}" type="datetimeFigureOut">
               <a:rPr lang="en-US" smtClean="0"/>
-              <a:t>9/15/2024</a:t>
+              <a:t>10/3/2024</a:t>
             </a:fld>
             <a:endParaRPr lang="en-US"/>
           </a:p>
@@ -1815,7 +1815,7 @@
           <a:p>
             <a:fld id="{2EA71DFD-377C-4EB5-BA3E-17FDF086A0CC}" type="datetimeFigureOut">
               <a:rPr lang="en-US" smtClean="0"/>
-              <a:t>9/15/2024</a:t>
+              <a:t>10/3/2024</a:t>
             </a:fld>
             <a:endParaRPr lang="en-US"/>
           </a:p>
@@ -1956,7 +1956,7 @@
           <a:p>
             <a:fld id="{2EA71DFD-377C-4EB5-BA3E-17FDF086A0CC}" type="datetimeFigureOut">
               <a:rPr lang="en-US" smtClean="0"/>
-              <a:t>9/15/2024</a:t>
+              <a:t>10/3/2024</a:t>
             </a:fld>
             <a:endParaRPr lang="en-US"/>
           </a:p>
@@ -2069,7 +2069,7 @@
           <a:p>
             <a:fld id="{2EA71DFD-377C-4EB5-BA3E-17FDF086A0CC}" type="datetimeFigureOut">
               <a:rPr lang="en-US" smtClean="0"/>
-              <a:t>9/15/2024</a:t>
+              <a:t>10/3/2024</a:t>
             </a:fld>
             <a:endParaRPr lang="en-US"/>
           </a:p>
@@ -2380,7 +2380,7 @@
           <a:p>
             <a:fld id="{2EA71DFD-377C-4EB5-BA3E-17FDF086A0CC}" type="datetimeFigureOut">
               <a:rPr lang="en-US" smtClean="0"/>
-              <a:t>9/15/2024</a:t>
+              <a:t>10/3/2024</a:t>
             </a:fld>
             <a:endParaRPr lang="en-US"/>
           </a:p>
@@ -2668,7 +2668,7 @@
           <a:p>
             <a:fld id="{2EA71DFD-377C-4EB5-BA3E-17FDF086A0CC}" type="datetimeFigureOut">
               <a:rPr lang="en-US" smtClean="0"/>
-              <a:t>9/15/2024</a:t>
+              <a:t>10/3/2024</a:t>
             </a:fld>
             <a:endParaRPr lang="en-US"/>
           </a:p>
@@ -2909,7 +2909,7 @@
           <a:p>
             <a:fld id="{2EA71DFD-377C-4EB5-BA3E-17FDF086A0CC}" type="datetimeFigureOut">
               <a:rPr lang="en-US" smtClean="0"/>
-              <a:t>9/15/2024</a:t>
+              <a:t>10/3/2024</a:t>
             </a:fld>
             <a:endParaRPr lang="en-US"/>
           </a:p>
@@ -4207,14 +4207,14 @@
           <p:nvPr>
             <p:extLst>
               <p:ext uri="{D42A27DB-BD31-4B8C-83A1-F6EECF244321}">
-                <p14:modId xmlns:p14="http://schemas.microsoft.com/office/powerpoint/2010/main" val="4155115816"/>
+                <p14:modId xmlns:p14="http://schemas.microsoft.com/office/powerpoint/2010/main" val="2301939525"/>
               </p:ext>
             </p:extLst>
           </p:nvPr>
         </p:nvGraphicFramePr>
         <p:xfrm>
           <a:off x="8770974" y="4735939"/>
-          <a:ext cx="2550545" cy="807100"/>
+          <a:ext cx="2879159" cy="807100"/>
         </p:xfrm>
         <a:graphic>
           <a:graphicData uri="http://schemas.openxmlformats.org/drawingml/2006/table">
@@ -4223,14 +4223,14 @@
                 <a:tableStyleId>{5C22544A-7EE6-4342-B048-85BDC9FD1C3A}</a:tableStyleId>
               </a:tblPr>
               <a:tblGrid>
-                <a:gridCol w="372629">
+                <a:gridCol w="420639">
                   <a:extLst>
                     <a:ext uri="{9D8B030D-6E8A-4147-A177-3AD203B41FA5}">
                       <a16:colId xmlns:a16="http://schemas.microsoft.com/office/drawing/2014/main" val="1454048853"/>
                     </a:ext>
                   </a:extLst>
                 </a:gridCol>
-                <a:gridCol w="2177916">
+                <a:gridCol w="2458520">
                   <a:extLst>
                     <a:ext uri="{9D8B030D-6E8A-4147-A177-3AD203B41FA5}">
                       <a16:colId xmlns:a16="http://schemas.microsoft.com/office/drawing/2014/main" val="3290258725"/>
@@ -4327,7 +4327,7 @@
                       </a:r>
                       <a:r>
                         <a:rPr lang="en-US" sz="1000" dirty="0"/>
-                        <a:t> TEXT NOT NULL</a:t>
+                        <a:t> TEXT UNIQUE NOT NULL</a:t>
                       </a:r>
                     </a:p>
                   </a:txBody>
@@ -5848,6 +5848,7 @@
             </a:extLst>
           </p:cNvPr>
           <p:cNvCxnSpPr>
+            <a:cxnSpLocks/>
             <a:endCxn id="6" idx="1"/>
           </p:cNvCxnSpPr>
           <p:nvPr/>
@@ -5890,6 +5891,7 @@
             </a:extLst>
           </p:cNvPr>
           <p:cNvCxnSpPr>
+            <a:cxnSpLocks/>
             <a:endCxn id="6" idx="1"/>
           </p:cNvCxnSpPr>
           <p:nvPr/>

</xml_diff>